<commit_message>
Modifica las caratulas con el titulo correcto
</commit_message>
<xml_diff>
--- a/Diapositivas/BlockDiagram_CurrentSteeringDAC.pptx
+++ b/Diapositivas/BlockDiagram_CurrentSteeringDAC.pptx
@@ -5,7 +5,7 @@
     <p:sldMasterId id="2147483648" r:id="rId1"/>
   </p:sldMasterIdLst>
   <p:sldIdLst>
-    <p:sldId id="256" r:id="rId2"/>
+    <p:sldId id="265" r:id="rId2"/>
     <p:sldId id="264" r:id="rId3"/>
   </p:sldIdLst>
   <p:sldSz cx="12192000" cy="6858000"/>
@@ -3334,14 +3334,6 @@
 <file path=ppt/slides/slide1.xml><?xml version="1.0" encoding="utf-8"?>
 <p:sld xmlns:a="http://schemas.openxmlformats.org/drawingml/2006/main" xmlns:r="http://schemas.openxmlformats.org/officeDocument/2006/relationships" xmlns:p="http://schemas.openxmlformats.org/presentationml/2006/main">
   <p:cSld>
-    <p:bg>
-      <p:bgPr>
-        <a:solidFill>
-          <a:schemeClr val="bg1"/>
-        </a:solidFill>
-        <a:effectLst/>
-      </p:bgPr>
-    </p:bg>
     <p:spTree>
       <p:nvGrpSpPr>
         <p:cNvPr id="1" name=""/>
@@ -3356,148 +3348,25 @@
           <a:chExt cx="0" cy="0"/>
         </a:xfrm>
       </p:grpSpPr>
-      <p:sp useBgFill="1">
-        <p:nvSpPr>
-          <p:cNvPr id="1033" name="Rectangle 1032">
-            <a:extLst>
-              <a:ext uri="{FF2B5EF4-FFF2-40B4-BE49-F238E27FC236}">
-                <a16:creationId xmlns:a16="http://schemas.microsoft.com/office/drawing/2014/main" id="{23D09407-53BC-485E-B4CE-BC5E4FC4B25B}"/>
-              </a:ext>
-              <a:ext uri="{C183D7F6-B498-43B3-948B-1728B52AA6E4}">
-                <adec:decorative xmlns="" xmlns:adec="http://schemas.microsoft.com/office/drawing/2017/decorative" val="1"/>
-              </a:ext>
-            </a:extLst>
-          </p:cNvPr>
-          <p:cNvSpPr>
-            <a:spLocks noGrp="1" noRot="1" noChangeAspect="1" noMove="1" noResize="1" noEditPoints="1" noAdjustHandles="1" noChangeArrowheads="1" noChangeShapeType="1" noTextEdit="1"/>
-          </p:cNvSpPr>
-          <p:nvPr>
-            <p:extLst>
-              <p:ext uri="{386F3935-93C4-4BCD-93E2-E3B085C9AB24}">
-                <p16:designElem xmlns:p16="http://schemas.microsoft.com/office/powerpoint/2015/main" val="1"/>
-              </p:ext>
-            </p:extLst>
+      <p:sp>
+        <p:nvSpPr>
+          <p:cNvPr id="2" name="Título 1">
+            <a:extLst>
+              <a:ext uri="{FF2B5EF4-FFF2-40B4-BE49-F238E27FC236}">
+                <a16:creationId xmlns:a16="http://schemas.microsoft.com/office/drawing/2014/main" id="{B1F21F73-DD3C-163A-6153-44D057902AD1}"/>
+              </a:ext>
+            </a:extLst>
+          </p:cNvPr>
+          <p:cNvSpPr>
+            <a:spLocks noGrp="1"/>
+          </p:cNvSpPr>
+          <p:nvPr>
+            <p:ph type="ctrTitle"/>
           </p:nvPr>
         </p:nvSpPr>
         <p:spPr>
           <a:xfrm>
-            <a:off x="0" y="0"/>
-            <a:ext cx="12191695" cy="6858000"/>
-          </a:xfrm>
-          <a:prstGeom prst="rect">
-            <a:avLst/>
-          </a:prstGeom>
-          <a:ln>
-            <a:noFill/>
-          </a:ln>
-        </p:spPr>
-        <p:style>
-          <a:lnRef idx="2">
-            <a:schemeClr val="accent1">
-              <a:shade val="50000"/>
-            </a:schemeClr>
-          </a:lnRef>
-          <a:fillRef idx="1">
-            <a:schemeClr val="accent1"/>
-          </a:fillRef>
-          <a:effectRef idx="0">
-            <a:schemeClr val="accent1"/>
-          </a:effectRef>
-          <a:fontRef idx="minor">
-            <a:schemeClr val="lt1"/>
-          </a:fontRef>
-        </p:style>
-        <p:txBody>
-          <a:bodyPr rtlCol="0" anchor="ctr"/>
-          <a:lstStyle/>
-          <a:p>
-            <a:pPr algn="ctr"/>
-            <a:endParaRPr lang="en-US" noProof="0" dirty="0"/>
-          </a:p>
-        </p:txBody>
-      </p:sp>
-      <p:sp>
-        <p:nvSpPr>
-          <p:cNvPr id="1035" name="Rectangle 1034">
-            <a:extLst>
-              <a:ext uri="{FF2B5EF4-FFF2-40B4-BE49-F238E27FC236}">
-                <a16:creationId xmlns:a16="http://schemas.microsoft.com/office/drawing/2014/main" id="{921DB988-49FC-4608-B0A2-E2F3A4019041}"/>
-              </a:ext>
-              <a:ext uri="{C183D7F6-B498-43B3-948B-1728B52AA6E4}">
-                <adec:decorative xmlns="" xmlns:adec="http://schemas.microsoft.com/office/drawing/2017/decorative" val="1"/>
-              </a:ext>
-            </a:extLst>
-          </p:cNvPr>
-          <p:cNvSpPr>
-            <a:spLocks noGrp="1" noRot="1" noChangeAspect="1" noMove="1" noResize="1" noEditPoints="1" noAdjustHandles="1" noChangeArrowheads="1" noChangeShapeType="1" noTextEdit="1"/>
-          </p:cNvSpPr>
-          <p:nvPr>
-            <p:extLst>
-              <p:ext uri="{386F3935-93C4-4BCD-93E2-E3B085C9AB24}">
-                <p16:designElem xmlns:p16="http://schemas.microsoft.com/office/powerpoint/2015/main" val="1"/>
-              </p:ext>
-            </p:extLst>
-          </p:nvPr>
-        </p:nvSpPr>
-        <p:spPr>
-          <a:xfrm>
-            <a:off x="305" y="0"/>
-            <a:ext cx="12191695" cy="6858000"/>
-          </a:xfrm>
-          <a:prstGeom prst="rect">
-            <a:avLst/>
-          </a:prstGeom>
-          <a:solidFill>
-            <a:schemeClr val="bg1"/>
-          </a:solidFill>
-          <a:ln>
-            <a:noFill/>
-          </a:ln>
-        </p:spPr>
-        <p:style>
-          <a:lnRef idx="2">
-            <a:schemeClr val="accent1">
-              <a:shade val="50000"/>
-            </a:schemeClr>
-          </a:lnRef>
-          <a:fillRef idx="1">
-            <a:schemeClr val="accent1"/>
-          </a:fillRef>
-          <a:effectRef idx="0">
-            <a:schemeClr val="accent1"/>
-          </a:effectRef>
-          <a:fontRef idx="minor">
-            <a:schemeClr val="lt1"/>
-          </a:fontRef>
-        </p:style>
-        <p:txBody>
-          <a:bodyPr rtlCol="0" anchor="ctr"/>
-          <a:lstStyle/>
-          <a:p>
-            <a:pPr algn="ctr"/>
-            <a:endParaRPr lang="en-US" noProof="0" dirty="0"/>
-          </a:p>
-        </p:txBody>
-      </p:sp>
-      <p:sp>
-        <p:nvSpPr>
-          <p:cNvPr id="2" name="Título 1">
-            <a:extLst>
-              <a:ext uri="{FF2B5EF4-FFF2-40B4-BE49-F238E27FC236}">
-                <a16:creationId xmlns:a16="http://schemas.microsoft.com/office/drawing/2014/main" id="{B1F21F73-DD3C-163A-6153-44D057902AD1}"/>
-              </a:ext>
-            </a:extLst>
-          </p:cNvPr>
-          <p:cNvSpPr>
-            <a:spLocks noGrp="1"/>
-          </p:cNvSpPr>
-          <p:nvPr>
-            <p:ph type="ctrTitle"/>
-          </p:nvPr>
-        </p:nvSpPr>
-        <p:spPr>
-          <a:xfrm>
-            <a:off x="832103" y="2654300"/>
+            <a:off x="832102" y="2005371"/>
             <a:ext cx="10640754" cy="2451100"/>
           </a:xfrm>
         </p:spPr>
@@ -3507,7 +3376,7 @@
           </a:bodyPr>
           <a:lstStyle/>
           <a:p>
-            <a:pPr rtl="0">
+            <a:pPr>
               <a:spcBef>
                 <a:spcPts val="1600"/>
               </a:spcBef>
@@ -3534,6 +3403,32 @@
               </a:rPr>
             </a:br>
             <a:r>
+              <a:rPr lang="en-US" sz="4000" dirty="0">
+                <a:solidFill>
+                  <a:srgbClr val="000000"/>
+                </a:solidFill>
+                <a:latin typeface="PT Sans Narrow" panose="020B0506020203020204" pitchFamily="34" charset="0"/>
+              </a:rPr>
+              <a:t>Block Diagram</a:t>
+            </a:r>
+            <a:br>
+              <a:rPr lang="en-US" sz="4000" dirty="0">
+                <a:solidFill>
+                  <a:srgbClr val="000000"/>
+                </a:solidFill>
+                <a:latin typeface="PT Sans Narrow" panose="020B0506020203020204" pitchFamily="34" charset="0"/>
+              </a:rPr>
+            </a:br>
+            <a:r>
+              <a:rPr lang="en-US" sz="4000" dirty="0" smtClean="0">
+                <a:solidFill>
+                  <a:srgbClr val="000000"/>
+                </a:solidFill>
+                <a:latin typeface="PT Sans Narrow" panose="020B0506020203020204" pitchFamily="34" charset="0"/>
+              </a:rPr>
+              <a:t>Current Steering DAC</a:t>
+            </a:r>
+            <a:r>
               <a:rPr lang="en-US" sz="4000" b="0" i="0" u="none" strike="noStrike" noProof="0" dirty="0">
                 <a:solidFill>
                   <a:srgbClr val="000000"/>
@@ -3541,7 +3436,7 @@
                 <a:effectLst/>
                 <a:latin typeface="PT Sans Narrow" panose="020B0506020203020204" pitchFamily="34" charset="0"/>
               </a:rPr>
-              <a:t>Block Diagram</a:t>
+              <a:t/>
             </a:r>
             <a:br>
               <a:rPr lang="en-US" sz="4000" b="0" i="0" u="none" strike="noStrike" noProof="0" dirty="0">
@@ -3553,25 +3448,6 @@
               </a:rPr>
             </a:br>
             <a:r>
-              <a:rPr lang="en-US" sz="4000" b="0" i="0" u="none" strike="noStrike" noProof="0" dirty="0">
-                <a:solidFill>
-                  <a:srgbClr val="000000"/>
-                </a:solidFill>
-                <a:effectLst/>
-                <a:latin typeface="PT Sans Narrow" panose="020B0506020203020204" pitchFamily="34" charset="0"/>
-              </a:rPr>
-              <a:t>Phase Interpolator</a:t>
-            </a:r>
-            <a:br>
-              <a:rPr lang="en-US" sz="4000" b="0" i="0" u="none" strike="noStrike" noProof="0" dirty="0">
-                <a:solidFill>
-                  <a:srgbClr val="000000"/>
-                </a:solidFill>
-                <a:effectLst/>
-                <a:latin typeface="PT Sans Narrow" panose="020B0506020203020204" pitchFamily="34" charset="0"/>
-              </a:rPr>
-            </a:br>
-            <a:r>
               <a:rPr lang="en-US" sz="1100" b="0" noProof="0" dirty="0">
                 <a:effectLst/>
               </a:rPr>
@@ -3630,1074 +3506,6 @@
           </a:p>
         </p:txBody>
       </p:sp>
-      <p:grpSp>
-        <p:nvGrpSpPr>
-          <p:cNvPr id="1037" name="Group 1036">
-            <a:extLst>
-              <a:ext uri="{FF2B5EF4-FFF2-40B4-BE49-F238E27FC236}">
-                <a16:creationId xmlns:a16="http://schemas.microsoft.com/office/drawing/2014/main" id="{E9B930FD-8671-4C4C-ADCF-73AC1D0CD417}"/>
-              </a:ext>
-              <a:ext uri="{C183D7F6-B498-43B3-948B-1728B52AA6E4}">
-                <adec:decorative xmlns="" xmlns:adec="http://schemas.microsoft.com/office/drawing/2017/decorative" val="1"/>
-              </a:ext>
-            </a:extLst>
-          </p:cNvPr>
-          <p:cNvGrpSpPr>
-            <a:grpSpLocks noGrp="1" noUngrp="1" noRot="1" noChangeAspect="1" noMove="1" noResize="1"/>
-          </p:cNvGrpSpPr>
-          <p:nvPr>
-            <p:extLst>
-              <p:ext uri="{386F3935-93C4-4BCD-93E2-E3B085C9AB24}">
-                <p16:designElem xmlns:p16="http://schemas.microsoft.com/office/powerpoint/2015/main" val="1"/>
-              </p:ext>
-            </p:extLst>
-          </p:nvPr>
-        </p:nvGrpSpPr>
-        <p:grpSpPr>
-          <a:xfrm flipH="1">
-            <a:off x="9676747" y="0"/>
-            <a:ext cx="2514948" cy="2174333"/>
-            <a:chOff x="-305" y="-4155"/>
-            <a:chExt cx="2514948" cy="2174333"/>
-          </a:xfrm>
-        </p:grpSpPr>
-        <p:sp>
-          <p:nvSpPr>
-            <p:cNvPr id="1038" name="Freeform: Shape 1037">
-              <a:extLst>
-                <a:ext uri="{FF2B5EF4-FFF2-40B4-BE49-F238E27FC236}">
-                  <a16:creationId xmlns:a16="http://schemas.microsoft.com/office/drawing/2014/main" id="{C35B12C1-569C-4E37-AA33-7EF215F201B8}"/>
-                </a:ext>
-                <a:ext uri="{C183D7F6-B498-43B3-948B-1728B52AA6E4}">
-                  <adec:decorative xmlns="" xmlns:adec="http://schemas.microsoft.com/office/drawing/2017/decorative" val="1"/>
-                </a:ext>
-              </a:extLst>
-            </p:cNvPr>
-            <p:cNvSpPr/>
-            <p:nvPr>
-              <p:extLst>
-                <p:ext uri="{386F3935-93C4-4BCD-93E2-E3B085C9AB24}">
-                  <p16:designElem xmlns:p16="http://schemas.microsoft.com/office/powerpoint/2015/main" val="1"/>
-                </p:ext>
-              </p:extLst>
-            </p:nvPr>
-          </p:nvSpPr>
-          <p:spPr>
-            <a:xfrm>
-              <a:off x="-305" y="0"/>
-              <a:ext cx="2514948" cy="2170178"/>
-            </a:xfrm>
-            <a:custGeom>
-              <a:avLst/>
-              <a:gdLst>
-                <a:gd name="connsiteX0" fmla="*/ 2466091 w 2514948"/>
-                <a:gd name="connsiteY0" fmla="*/ 0 h 2170178"/>
-                <a:gd name="connsiteX1" fmla="*/ 2514948 w 2514948"/>
-                <a:gd name="connsiteY1" fmla="*/ 0 h 2170178"/>
-                <a:gd name="connsiteX2" fmla="*/ 2512286 w 2514948"/>
-                <a:gd name="connsiteY2" fmla="*/ 12375 h 2170178"/>
-                <a:gd name="connsiteX3" fmla="*/ 2394961 w 2514948"/>
-                <a:gd name="connsiteY3" fmla="*/ 368660 h 2170178"/>
-                <a:gd name="connsiteX4" fmla="*/ 2289734 w 2514948"/>
-                <a:gd name="connsiteY4" fmla="*/ 598078 h 2170178"/>
-                <a:gd name="connsiteX5" fmla="*/ 2163747 w 2514948"/>
-                <a:gd name="connsiteY5" fmla="*/ 819078 h 2170178"/>
-                <a:gd name="connsiteX6" fmla="*/ 1852241 w 2514948"/>
-                <a:gd name="connsiteY6" fmla="*/ 1228932 h 2170178"/>
-                <a:gd name="connsiteX7" fmla="*/ 1668235 w 2514948"/>
-                <a:gd name="connsiteY7" fmla="*/ 1413844 h 2170178"/>
-                <a:gd name="connsiteX8" fmla="*/ 1619510 w 2514948"/>
-                <a:gd name="connsiteY8" fmla="*/ 1457722 h 2170178"/>
-                <a:gd name="connsiteX9" fmla="*/ 1569835 w 2514948"/>
-                <a:gd name="connsiteY9" fmla="*/ 1500704 h 2170178"/>
-                <a:gd name="connsiteX10" fmla="*/ 1467169 w 2514948"/>
-                <a:gd name="connsiteY10" fmla="*/ 1583266 h 2170178"/>
-                <a:gd name="connsiteX11" fmla="*/ 1018393 w 2514948"/>
-                <a:gd name="connsiteY11" fmla="*/ 1867576 h 2170178"/>
-                <a:gd name="connsiteX12" fmla="*/ 255857 w 2514948"/>
-                <a:gd name="connsiteY12" fmla="*/ 2133049 h 2170178"/>
-                <a:gd name="connsiteX13" fmla="*/ 0 w 2514948"/>
-                <a:gd name="connsiteY13" fmla="*/ 2170178 h 2170178"/>
-                <a:gd name="connsiteX14" fmla="*/ 0 w 2514948"/>
-                <a:gd name="connsiteY14" fmla="*/ 1940056 h 2170178"/>
-                <a:gd name="connsiteX15" fmla="*/ 201609 w 2514948"/>
-                <a:gd name="connsiteY15" fmla="*/ 1902856 h 2170178"/>
-                <a:gd name="connsiteX16" fmla="*/ 440974 w 2514948"/>
-                <a:gd name="connsiteY16" fmla="*/ 1838472 h 2170178"/>
-                <a:gd name="connsiteX17" fmla="*/ 674558 w 2514948"/>
-                <a:gd name="connsiteY17" fmla="*/ 1756359 h 2170178"/>
-                <a:gd name="connsiteX18" fmla="*/ 901222 w 2514948"/>
-                <a:gd name="connsiteY18" fmla="*/ 1657142 h 2170178"/>
-                <a:gd name="connsiteX19" fmla="*/ 1330943 w 2514948"/>
-                <a:gd name="connsiteY19" fmla="*/ 1413396 h 2170178"/>
-                <a:gd name="connsiteX20" fmla="*/ 1432566 w 2514948"/>
-                <a:gd name="connsiteY20" fmla="*/ 1343193 h 2170178"/>
-                <a:gd name="connsiteX21" fmla="*/ 1482527 w 2514948"/>
-                <a:gd name="connsiteY21" fmla="*/ 1306926 h 2170178"/>
-                <a:gd name="connsiteX22" fmla="*/ 1531821 w 2514948"/>
-                <a:gd name="connsiteY22" fmla="*/ 1269765 h 2170178"/>
-                <a:gd name="connsiteX23" fmla="*/ 1721986 w 2514948"/>
-                <a:gd name="connsiteY23" fmla="*/ 1112073 h 2170178"/>
-                <a:gd name="connsiteX24" fmla="*/ 2061460 w 2514948"/>
-                <a:gd name="connsiteY24" fmla="*/ 754336 h 2170178"/>
-                <a:gd name="connsiteX25" fmla="*/ 2206218 w 2514948"/>
-                <a:gd name="connsiteY25" fmla="*/ 554827 h 2170178"/>
-                <a:gd name="connsiteX26" fmla="*/ 2329455 w 2514948"/>
-                <a:gd name="connsiteY26" fmla="*/ 341886 h 2170178"/>
-                <a:gd name="connsiteX27" fmla="*/ 2356757 w 2514948"/>
-                <a:gd name="connsiteY27" fmla="*/ 286815 h 2170178"/>
-                <a:gd name="connsiteX28" fmla="*/ 2370030 w 2514948"/>
-                <a:gd name="connsiteY28" fmla="*/ 259056 h 2170178"/>
-                <a:gd name="connsiteX29" fmla="*/ 2382637 w 2514948"/>
-                <a:gd name="connsiteY29" fmla="*/ 231028 h 2170178"/>
-                <a:gd name="connsiteX30" fmla="*/ 2406716 w 2514948"/>
-                <a:gd name="connsiteY30" fmla="*/ 174525 h 2170178"/>
-                <a:gd name="connsiteX31" fmla="*/ 2429278 w 2514948"/>
-                <a:gd name="connsiteY31" fmla="*/ 117393 h 2170178"/>
-              </a:gdLst>
-              <a:ahLst/>
-              <a:cxnLst>
-                <a:cxn ang="0">
-                  <a:pos x="connsiteX0" y="connsiteY0"/>
-                </a:cxn>
-                <a:cxn ang="0">
-                  <a:pos x="connsiteX1" y="connsiteY1"/>
-                </a:cxn>
-                <a:cxn ang="0">
-                  <a:pos x="connsiteX2" y="connsiteY2"/>
-                </a:cxn>
-                <a:cxn ang="0">
-                  <a:pos x="connsiteX3" y="connsiteY3"/>
-                </a:cxn>
-                <a:cxn ang="0">
-                  <a:pos x="connsiteX4" y="connsiteY4"/>
-                </a:cxn>
-                <a:cxn ang="0">
-                  <a:pos x="connsiteX5" y="connsiteY5"/>
-                </a:cxn>
-                <a:cxn ang="0">
-                  <a:pos x="connsiteX6" y="connsiteY6"/>
-                </a:cxn>
-                <a:cxn ang="0">
-                  <a:pos x="connsiteX7" y="connsiteY7"/>
-                </a:cxn>
-                <a:cxn ang="0">
-                  <a:pos x="connsiteX8" y="connsiteY8"/>
-                </a:cxn>
-                <a:cxn ang="0">
-                  <a:pos x="connsiteX9" y="connsiteY9"/>
-                </a:cxn>
-                <a:cxn ang="0">
-                  <a:pos x="connsiteX10" y="connsiteY10"/>
-                </a:cxn>
-                <a:cxn ang="0">
-                  <a:pos x="connsiteX11" y="connsiteY11"/>
-                </a:cxn>
-                <a:cxn ang="0">
-                  <a:pos x="connsiteX12" y="connsiteY12"/>
-                </a:cxn>
-                <a:cxn ang="0">
-                  <a:pos x="connsiteX13" y="connsiteY13"/>
-                </a:cxn>
-                <a:cxn ang="0">
-                  <a:pos x="connsiteX14" y="connsiteY14"/>
-                </a:cxn>
-                <a:cxn ang="0">
-                  <a:pos x="connsiteX15" y="connsiteY15"/>
-                </a:cxn>
-                <a:cxn ang="0">
-                  <a:pos x="connsiteX16" y="connsiteY16"/>
-                </a:cxn>
-                <a:cxn ang="0">
-                  <a:pos x="connsiteX17" y="connsiteY17"/>
-                </a:cxn>
-                <a:cxn ang="0">
-                  <a:pos x="connsiteX18" y="connsiteY18"/>
-                </a:cxn>
-                <a:cxn ang="0">
-                  <a:pos x="connsiteX19" y="connsiteY19"/>
-                </a:cxn>
-                <a:cxn ang="0">
-                  <a:pos x="connsiteX20" y="connsiteY20"/>
-                </a:cxn>
-                <a:cxn ang="0">
-                  <a:pos x="connsiteX21" y="connsiteY21"/>
-                </a:cxn>
-                <a:cxn ang="0">
-                  <a:pos x="connsiteX22" y="connsiteY22"/>
-                </a:cxn>
-                <a:cxn ang="0">
-                  <a:pos x="connsiteX23" y="connsiteY23"/>
-                </a:cxn>
-                <a:cxn ang="0">
-                  <a:pos x="connsiteX24" y="connsiteY24"/>
-                </a:cxn>
-                <a:cxn ang="0">
-                  <a:pos x="connsiteX25" y="connsiteY25"/>
-                </a:cxn>
-                <a:cxn ang="0">
-                  <a:pos x="connsiteX26" y="connsiteY26"/>
-                </a:cxn>
-                <a:cxn ang="0">
-                  <a:pos x="connsiteX27" y="connsiteY27"/>
-                </a:cxn>
-                <a:cxn ang="0">
-                  <a:pos x="connsiteX28" y="connsiteY28"/>
-                </a:cxn>
-                <a:cxn ang="0">
-                  <a:pos x="connsiteX29" y="connsiteY29"/>
-                </a:cxn>
-                <a:cxn ang="0">
-                  <a:pos x="connsiteX30" y="connsiteY30"/>
-                </a:cxn>
-                <a:cxn ang="0">
-                  <a:pos x="connsiteX31" y="connsiteY31"/>
-                </a:cxn>
-              </a:cxnLst>
-              <a:rect l="l" t="t" r="r" b="b"/>
-              <a:pathLst>
-                <a:path w="2514948" h="2170178">
-                  <a:moveTo>
-                    <a:pt x="2466091" y="0"/>
-                  </a:moveTo>
-                  <a:lnTo>
-                    <a:pt x="2514948" y="0"/>
-                  </a:lnTo>
-                  <a:lnTo>
-                    <a:pt x="2512286" y="12375"/>
-                  </a:lnTo>
-                  <a:cubicBezTo>
-                    <a:pt x="2481760" y="133161"/>
-                    <a:pt x="2442526" y="252239"/>
-                    <a:pt x="2394961" y="368660"/>
-                  </a:cubicBezTo>
-                  <a:cubicBezTo>
-                    <a:pt x="2363109" y="446208"/>
-                    <a:pt x="2328603" y="523039"/>
-                    <a:pt x="2289734" y="598078"/>
-                  </a:cubicBezTo>
-                  <a:cubicBezTo>
-                    <a:pt x="2251436" y="673387"/>
-                    <a:pt x="2209251" y="747083"/>
-                    <a:pt x="2163747" y="819078"/>
-                  </a:cubicBezTo>
-                  <a:cubicBezTo>
-                    <a:pt x="2072646" y="962979"/>
-                    <a:pt x="1968652" y="1100611"/>
-                    <a:pt x="1852241" y="1228932"/>
-                  </a:cubicBezTo>
-                  <a:cubicBezTo>
-                    <a:pt x="1793748" y="1292868"/>
-                    <a:pt x="1732698" y="1354923"/>
-                    <a:pt x="1668235" y="1413844"/>
-                  </a:cubicBezTo>
-                  <a:cubicBezTo>
-                    <a:pt x="1652214" y="1428709"/>
-                    <a:pt x="1636100" y="1443395"/>
-                    <a:pt x="1619510" y="1457722"/>
-                  </a:cubicBezTo>
-                  <a:cubicBezTo>
-                    <a:pt x="1603015" y="1472140"/>
-                    <a:pt x="1586805" y="1486825"/>
-                    <a:pt x="1569835" y="1500704"/>
-                  </a:cubicBezTo>
-                  <a:cubicBezTo>
-                    <a:pt x="1536276" y="1528911"/>
-                    <a:pt x="1501865" y="1556223"/>
-                    <a:pt x="1467169" y="1583266"/>
-                  </a:cubicBezTo>
-                  <a:cubicBezTo>
-                    <a:pt x="1327719" y="1690722"/>
-                    <a:pt x="1177085" y="1785910"/>
-                    <a:pt x="1018393" y="1867576"/>
-                  </a:cubicBezTo>
-                  <a:cubicBezTo>
-                    <a:pt x="780425" y="1990142"/>
-                    <a:pt x="522567" y="2080875"/>
-                    <a:pt x="255857" y="2133049"/>
-                  </a:cubicBezTo>
-                  <a:lnTo>
-                    <a:pt x="0" y="2170178"/>
-                  </a:lnTo>
-                  <a:lnTo>
-                    <a:pt x="0" y="1940056"/>
-                  </a:lnTo>
-                  <a:lnTo>
-                    <a:pt x="201609" y="1902856"/>
-                  </a:lnTo>
-                  <a:cubicBezTo>
-                    <a:pt x="282186" y="1884231"/>
-                    <a:pt x="362102" y="1863008"/>
-                    <a:pt x="440974" y="1838472"/>
-                  </a:cubicBezTo>
-                  <a:cubicBezTo>
-                    <a:pt x="519848" y="1814027"/>
-                    <a:pt x="597771" y="1786627"/>
-                    <a:pt x="674558" y="1756359"/>
-                  </a:cubicBezTo>
-                  <a:cubicBezTo>
-                    <a:pt x="751250" y="1726003"/>
-                    <a:pt x="826900" y="1692870"/>
-                    <a:pt x="901222" y="1657142"/>
-                  </a:cubicBezTo>
-                  <a:cubicBezTo>
-                    <a:pt x="1049865" y="1585774"/>
-                    <a:pt x="1193581" y="1504376"/>
-                    <a:pt x="1330943" y="1413396"/>
-                  </a:cubicBezTo>
-                  <a:cubicBezTo>
-                    <a:pt x="1365165" y="1390563"/>
-                    <a:pt x="1399293" y="1367370"/>
-                    <a:pt x="1432566" y="1343193"/>
-                  </a:cubicBezTo>
-                  <a:cubicBezTo>
-                    <a:pt x="1449441" y="1331373"/>
-                    <a:pt x="1465936" y="1319104"/>
-                    <a:pt x="1482527" y="1306926"/>
-                  </a:cubicBezTo>
-                  <a:cubicBezTo>
-                    <a:pt x="1499210" y="1294837"/>
-                    <a:pt x="1515611" y="1282391"/>
-                    <a:pt x="1531821" y="1269765"/>
-                  </a:cubicBezTo>
-                  <a:cubicBezTo>
-                    <a:pt x="1596947" y="1219350"/>
-                    <a:pt x="1660652" y="1167055"/>
-                    <a:pt x="1721986" y="1112073"/>
-                  </a:cubicBezTo>
-                  <a:cubicBezTo>
-                    <a:pt x="1844940" y="1002469"/>
-                    <a:pt x="1958983" y="882926"/>
-                    <a:pt x="2061460" y="754336"/>
-                  </a:cubicBezTo>
-                  <a:cubicBezTo>
-                    <a:pt x="2112652" y="690042"/>
-                    <a:pt x="2161094" y="623510"/>
-                    <a:pt x="2206218" y="554827"/>
-                  </a:cubicBezTo>
-                  <a:cubicBezTo>
-                    <a:pt x="2250583" y="485787"/>
-                    <a:pt x="2292484" y="415046"/>
-                    <a:pt x="2329455" y="341886"/>
-                  </a:cubicBezTo>
-                  <a:cubicBezTo>
-                    <a:pt x="2339030" y="323709"/>
-                    <a:pt x="2347941" y="305261"/>
-                    <a:pt x="2356757" y="286815"/>
-                  </a:cubicBezTo>
-                  <a:lnTo>
-                    <a:pt x="2370030" y="259056"/>
-                  </a:lnTo>
-                  <a:lnTo>
-                    <a:pt x="2382637" y="231028"/>
-                  </a:lnTo>
-                  <a:cubicBezTo>
-                    <a:pt x="2390885" y="212312"/>
-                    <a:pt x="2399227" y="193598"/>
-                    <a:pt x="2406716" y="174525"/>
-                  </a:cubicBezTo>
-                  <a:cubicBezTo>
-                    <a:pt x="2414206" y="155452"/>
-                    <a:pt x="2422453" y="136646"/>
-                    <a:pt x="2429278" y="117393"/>
-                  </a:cubicBezTo>
-                  <a:close/>
-                </a:path>
-              </a:pathLst>
-            </a:custGeom>
-            <a:gradFill>
-              <a:gsLst>
-                <a:gs pos="2000">
-                  <a:schemeClr val="bg1">
-                    <a:alpha val="10000"/>
-                  </a:schemeClr>
-                </a:gs>
-                <a:gs pos="16000">
-                  <a:schemeClr val="accent6">
-                    <a:alpha val="10000"/>
-                  </a:schemeClr>
-                </a:gs>
-                <a:gs pos="100000">
-                  <a:schemeClr val="bg1">
-                    <a:alpha val="10000"/>
-                  </a:schemeClr>
-                </a:gs>
-                <a:gs pos="85000">
-                  <a:schemeClr val="accent1">
-                    <a:alpha val="10000"/>
-                  </a:schemeClr>
-                </a:gs>
-              </a:gsLst>
-              <a:lin ang="12000000" scaled="0"/>
-            </a:gradFill>
-            <a:ln>
-              <a:noFill/>
-            </a:ln>
-          </p:spPr>
-          <p:style>
-            <a:lnRef idx="2">
-              <a:schemeClr val="accent1">
-                <a:shade val="50000"/>
-              </a:schemeClr>
-            </a:lnRef>
-            <a:fillRef idx="1">
-              <a:schemeClr val="accent1"/>
-            </a:fillRef>
-            <a:effectRef idx="0">
-              <a:schemeClr val="accent1"/>
-            </a:effectRef>
-            <a:fontRef idx="minor">
-              <a:schemeClr val="lt1"/>
-            </a:fontRef>
-          </p:style>
-          <p:txBody>
-            <a:bodyPr rtlCol="0" anchor="ctr"/>
-            <a:lstStyle/>
-            <a:p>
-              <a:pPr algn="ctr"/>
-              <a:endParaRPr lang="en-US" noProof="0" dirty="0"/>
-            </a:p>
-          </p:txBody>
-        </p:sp>
-        <p:sp>
-          <p:nvSpPr>
-            <p:cNvPr id="1039" name="Freeform: Shape 1038">
-              <a:extLst>
-                <a:ext uri="{FF2B5EF4-FFF2-40B4-BE49-F238E27FC236}">
-                  <a16:creationId xmlns:a16="http://schemas.microsoft.com/office/drawing/2014/main" id="{F23E2660-7810-46F6-8752-187127C830C6}"/>
-                </a:ext>
-                <a:ext uri="{C183D7F6-B498-43B3-948B-1728B52AA6E4}">
-                  <adec:decorative xmlns="" xmlns:adec="http://schemas.microsoft.com/office/drawing/2017/decorative" val="1"/>
-                </a:ext>
-              </a:extLst>
-            </p:cNvPr>
-            <p:cNvSpPr/>
-            <p:nvPr>
-              <p:extLst>
-                <p:ext uri="{386F3935-93C4-4BCD-93E2-E3B085C9AB24}">
-                  <p16:designElem xmlns:p16="http://schemas.microsoft.com/office/powerpoint/2015/main" val="1"/>
-                </p:ext>
-              </p:extLst>
-            </p:nvPr>
-          </p:nvSpPr>
-          <p:spPr>
-            <a:xfrm>
-              <a:off x="-305" y="-4155"/>
-              <a:ext cx="2493062" cy="1947896"/>
-            </a:xfrm>
-            <a:custGeom>
-              <a:avLst/>
-              <a:gdLst>
-                <a:gd name="connsiteX0" fmla="*/ 1896911 w 2493062"/>
-                <a:gd name="connsiteY0" fmla="*/ 0 h 1947896"/>
-                <a:gd name="connsiteX1" fmla="*/ 2493062 w 2493062"/>
-                <a:gd name="connsiteY1" fmla="*/ 0 h 1947896"/>
-                <a:gd name="connsiteX2" fmla="*/ 2435315 w 2493062"/>
-                <a:gd name="connsiteY2" fmla="*/ 178165 h 1947896"/>
-                <a:gd name="connsiteX3" fmla="*/ 93066 w 2493062"/>
-                <a:gd name="connsiteY3" fmla="*/ 1935859 h 1947896"/>
-                <a:gd name="connsiteX4" fmla="*/ 0 w 2493062"/>
-                <a:gd name="connsiteY4" fmla="*/ 1947896 h 1947896"/>
-                <a:gd name="connsiteX5" fmla="*/ 0 w 2493062"/>
-                <a:gd name="connsiteY5" fmla="*/ 1404756 h 1947896"/>
-                <a:gd name="connsiteX6" fmla="*/ 17392 w 2493062"/>
-                <a:gd name="connsiteY6" fmla="*/ 1402364 h 1947896"/>
-                <a:gd name="connsiteX7" fmla="*/ 464249 w 2493062"/>
-                <a:gd name="connsiteY7" fmla="*/ 1281208 h 1947896"/>
-                <a:gd name="connsiteX8" fmla="*/ 1260556 w 2493062"/>
-                <a:gd name="connsiteY8" fmla="*/ 833835 h 1947896"/>
-                <a:gd name="connsiteX9" fmla="*/ 1807924 w 2493062"/>
-                <a:gd name="connsiteY9" fmla="*/ 193222 h 1947896"/>
-                <a:gd name="connsiteX10" fmla="*/ 1874357 w 2493062"/>
-                <a:gd name="connsiteY10" fmla="*/ 58333 h 1947896"/>
-              </a:gdLst>
-              <a:ahLst/>
-              <a:cxnLst>
-                <a:cxn ang="0">
-                  <a:pos x="connsiteX0" y="connsiteY0"/>
-                </a:cxn>
-                <a:cxn ang="0">
-                  <a:pos x="connsiteX1" y="connsiteY1"/>
-                </a:cxn>
-                <a:cxn ang="0">
-                  <a:pos x="connsiteX2" y="connsiteY2"/>
-                </a:cxn>
-                <a:cxn ang="0">
-                  <a:pos x="connsiteX3" y="connsiteY3"/>
-                </a:cxn>
-                <a:cxn ang="0">
-                  <a:pos x="connsiteX4" y="connsiteY4"/>
-                </a:cxn>
-                <a:cxn ang="0">
-                  <a:pos x="connsiteX5" y="connsiteY5"/>
-                </a:cxn>
-                <a:cxn ang="0">
-                  <a:pos x="connsiteX6" y="connsiteY6"/>
-                </a:cxn>
-                <a:cxn ang="0">
-                  <a:pos x="connsiteX7" y="connsiteY7"/>
-                </a:cxn>
-                <a:cxn ang="0">
-                  <a:pos x="connsiteX8" y="connsiteY8"/>
-                </a:cxn>
-                <a:cxn ang="0">
-                  <a:pos x="connsiteX9" y="connsiteY9"/>
-                </a:cxn>
-                <a:cxn ang="0">
-                  <a:pos x="connsiteX10" y="connsiteY10"/>
-                </a:cxn>
-              </a:cxnLst>
-              <a:rect l="l" t="t" r="r" b="b"/>
-              <a:pathLst>
-                <a:path w="2493062" h="1947896">
-                  <a:moveTo>
-                    <a:pt x="1896911" y="0"/>
-                  </a:moveTo>
-                  <a:lnTo>
-                    <a:pt x="2493062" y="0"/>
-                  </a:lnTo>
-                  <a:lnTo>
-                    <a:pt x="2435315" y="178165"/>
-                  </a:lnTo>
-                  <a:cubicBezTo>
-                    <a:pt x="2088122" y="1071812"/>
-                    <a:pt x="1129732" y="1758033"/>
-                    <a:pt x="93066" y="1935859"/>
-                  </a:cubicBezTo>
-                  <a:lnTo>
-                    <a:pt x="0" y="1947896"/>
-                  </a:lnTo>
-                  <a:lnTo>
-                    <a:pt x="0" y="1404756"/>
-                  </a:lnTo>
-                  <a:lnTo>
-                    <a:pt x="17392" y="1402364"/>
-                  </a:lnTo>
-                  <a:cubicBezTo>
-                    <a:pt x="167719" y="1375030"/>
-                    <a:pt x="318070" y="1334398"/>
-                    <a:pt x="464249" y="1281208"/>
-                  </a:cubicBezTo>
-                  <a:cubicBezTo>
-                    <a:pt x="753480" y="1176081"/>
-                    <a:pt x="1028869" y="1021346"/>
-                    <a:pt x="1260556" y="833835"/>
-                  </a:cubicBezTo>
-                  <a:cubicBezTo>
-                    <a:pt x="1491960" y="646594"/>
-                    <a:pt x="1681177" y="425056"/>
-                    <a:pt x="1807924" y="193222"/>
-                  </a:cubicBezTo>
-                  <a:cubicBezTo>
-                    <a:pt x="1832328" y="148578"/>
-                    <a:pt x="1854477" y="103599"/>
-                    <a:pt x="1874357" y="58333"/>
-                  </a:cubicBezTo>
-                  <a:close/>
-                </a:path>
-              </a:pathLst>
-            </a:custGeom>
-            <a:gradFill>
-              <a:gsLst>
-                <a:gs pos="2000">
-                  <a:schemeClr val="bg1">
-                    <a:alpha val="10000"/>
-                  </a:schemeClr>
-                </a:gs>
-                <a:gs pos="16000">
-                  <a:schemeClr val="accent6">
-                    <a:alpha val="10000"/>
-                  </a:schemeClr>
-                </a:gs>
-                <a:gs pos="100000">
-                  <a:schemeClr val="bg1">
-                    <a:alpha val="10000"/>
-                  </a:schemeClr>
-                </a:gs>
-                <a:gs pos="85000">
-                  <a:schemeClr val="accent1">
-                    <a:alpha val="10000"/>
-                  </a:schemeClr>
-                </a:gs>
-              </a:gsLst>
-              <a:lin ang="12000000" scaled="0"/>
-            </a:gradFill>
-            <a:ln>
-              <a:noFill/>
-            </a:ln>
-          </p:spPr>
-          <p:style>
-            <a:lnRef idx="2">
-              <a:schemeClr val="accent1">
-                <a:shade val="50000"/>
-              </a:schemeClr>
-            </a:lnRef>
-            <a:fillRef idx="1">
-              <a:schemeClr val="accent1"/>
-            </a:fillRef>
-            <a:effectRef idx="0">
-              <a:schemeClr val="accent1"/>
-            </a:effectRef>
-            <a:fontRef idx="minor">
-              <a:schemeClr val="lt1"/>
-            </a:fontRef>
-          </p:style>
-          <p:txBody>
-            <a:bodyPr rtlCol="0" anchor="ctr"/>
-            <a:lstStyle/>
-            <a:p>
-              <a:pPr algn="ctr"/>
-              <a:endParaRPr lang="en-US" noProof="0" dirty="0"/>
-            </a:p>
-          </p:txBody>
-        </p:sp>
-        <p:sp>
-          <p:nvSpPr>
-            <p:cNvPr id="1040" name="Freeform: Shape 1039">
-              <a:extLst>
-                <a:ext uri="{FF2B5EF4-FFF2-40B4-BE49-F238E27FC236}">
-                  <a16:creationId xmlns:a16="http://schemas.microsoft.com/office/drawing/2014/main" id="{C991DC45-0378-45B3-B325-FB8F98545E6A}"/>
-                </a:ext>
-                <a:ext uri="{C183D7F6-B498-43B3-948B-1728B52AA6E4}">
-                  <adec:decorative xmlns="" xmlns:adec="http://schemas.microsoft.com/office/drawing/2017/decorative" val="1"/>
-                </a:ext>
-              </a:extLst>
-            </p:cNvPr>
-            <p:cNvSpPr/>
-            <p:nvPr>
-              <p:extLst>
-                <p:ext uri="{386F3935-93C4-4BCD-93E2-E3B085C9AB24}">
-                  <p16:designElem xmlns:p16="http://schemas.microsoft.com/office/powerpoint/2015/main" val="1"/>
-                </p:ext>
-              </p:extLst>
-            </p:nvPr>
-          </p:nvSpPr>
-          <p:spPr>
-            <a:xfrm>
-              <a:off x="-305" y="0"/>
-              <a:ext cx="2501089" cy="1972702"/>
-            </a:xfrm>
-            <a:custGeom>
-              <a:avLst/>
-              <a:gdLst>
-                <a:gd name="connsiteX0" fmla="*/ 2318728 w 2501089"/>
-                <a:gd name="connsiteY0" fmla="*/ 0 h 1972702"/>
-                <a:gd name="connsiteX1" fmla="*/ 2501089 w 2501089"/>
-                <a:gd name="connsiteY1" fmla="*/ 0 h 1972702"/>
-                <a:gd name="connsiteX2" fmla="*/ 2453909 w 2501089"/>
-                <a:gd name="connsiteY2" fmla="*/ 167837 h 1972702"/>
-                <a:gd name="connsiteX3" fmla="*/ 2361125 w 2501089"/>
-                <a:gd name="connsiteY3" fmla="*/ 392084 h 1972702"/>
-                <a:gd name="connsiteX4" fmla="*/ 1768255 w 2501089"/>
-                <a:gd name="connsiteY4" fmla="*/ 1167644 h 1972702"/>
-                <a:gd name="connsiteX5" fmla="*/ 1375125 w 2501089"/>
-                <a:gd name="connsiteY5" fmla="*/ 1471474 h 1972702"/>
-                <a:gd name="connsiteX6" fmla="*/ 935735 w 2501089"/>
-                <a:gd name="connsiteY6" fmla="*/ 1712713 h 1972702"/>
-                <a:gd name="connsiteX7" fmla="*/ 212353 w 2501089"/>
-                <a:gd name="connsiteY7" fmla="*/ 1940294 h 1972702"/>
-                <a:gd name="connsiteX8" fmla="*/ 0 w 2501089"/>
-                <a:gd name="connsiteY8" fmla="*/ 1972702 h 1972702"/>
-                <a:gd name="connsiteX9" fmla="*/ 0 w 2501089"/>
-                <a:gd name="connsiteY9" fmla="*/ 1732181 h 1972702"/>
-                <a:gd name="connsiteX10" fmla="*/ 161195 w 2501089"/>
-                <a:gd name="connsiteY10" fmla="*/ 1706590 h 1972702"/>
-                <a:gd name="connsiteX11" fmla="*/ 388463 w 2501089"/>
-                <a:gd name="connsiteY11" fmla="*/ 1652268 h 1972702"/>
-                <a:gd name="connsiteX12" fmla="*/ 826716 w 2501089"/>
-                <a:gd name="connsiteY12" fmla="*/ 1493950 h 1972702"/>
-                <a:gd name="connsiteX13" fmla="*/ 1609847 w 2501089"/>
-                <a:gd name="connsiteY13" fmla="*/ 1007535 h 1972702"/>
-                <a:gd name="connsiteX14" fmla="*/ 1929982 w 2501089"/>
-                <a:gd name="connsiteY14" fmla="*/ 682930 h 1972702"/>
-                <a:gd name="connsiteX15" fmla="*/ 2183093 w 2501089"/>
-                <a:gd name="connsiteY15" fmla="*/ 310149 h 1972702"/>
-                <a:gd name="connsiteX16" fmla="*/ 2280286 w 2501089"/>
-                <a:gd name="connsiteY16" fmla="*/ 108435 h 1972702"/>
-              </a:gdLst>
-              <a:ahLst/>
-              <a:cxnLst>
-                <a:cxn ang="0">
-                  <a:pos x="connsiteX0" y="connsiteY0"/>
-                </a:cxn>
-                <a:cxn ang="0">
-                  <a:pos x="connsiteX1" y="connsiteY1"/>
-                </a:cxn>
-                <a:cxn ang="0">
-                  <a:pos x="connsiteX2" y="connsiteY2"/>
-                </a:cxn>
-                <a:cxn ang="0">
-                  <a:pos x="connsiteX3" y="connsiteY3"/>
-                </a:cxn>
-                <a:cxn ang="0">
-                  <a:pos x="connsiteX4" y="connsiteY4"/>
-                </a:cxn>
-                <a:cxn ang="0">
-                  <a:pos x="connsiteX5" y="connsiteY5"/>
-                </a:cxn>
-                <a:cxn ang="0">
-                  <a:pos x="connsiteX6" y="connsiteY6"/>
-                </a:cxn>
-                <a:cxn ang="0">
-                  <a:pos x="connsiteX7" y="connsiteY7"/>
-                </a:cxn>
-                <a:cxn ang="0">
-                  <a:pos x="connsiteX8" y="connsiteY8"/>
-                </a:cxn>
-                <a:cxn ang="0">
-                  <a:pos x="connsiteX9" y="connsiteY9"/>
-                </a:cxn>
-                <a:cxn ang="0">
-                  <a:pos x="connsiteX10" y="connsiteY10"/>
-                </a:cxn>
-                <a:cxn ang="0">
-                  <a:pos x="connsiteX11" y="connsiteY11"/>
-                </a:cxn>
-                <a:cxn ang="0">
-                  <a:pos x="connsiteX12" y="connsiteY12"/>
-                </a:cxn>
-                <a:cxn ang="0">
-                  <a:pos x="connsiteX13" y="connsiteY13"/>
-                </a:cxn>
-                <a:cxn ang="0">
-                  <a:pos x="connsiteX14" y="connsiteY14"/>
-                </a:cxn>
-                <a:cxn ang="0">
-                  <a:pos x="connsiteX15" y="connsiteY15"/>
-                </a:cxn>
-                <a:cxn ang="0">
-                  <a:pos x="connsiteX16" y="connsiteY16"/>
-                </a:cxn>
-              </a:cxnLst>
-              <a:rect l="l" t="t" r="r" b="b"/>
-              <a:pathLst>
-                <a:path w="2501089" h="1972702">
-                  <a:moveTo>
-                    <a:pt x="2318728" y="0"/>
-                  </a:moveTo>
-                  <a:lnTo>
-                    <a:pt x="2501089" y="0"/>
-                  </a:lnTo>
-                  <a:lnTo>
-                    <a:pt x="2453909" y="167837"/>
-                  </a:lnTo>
-                  <a:cubicBezTo>
-                    <a:pt x="2427555" y="244153"/>
-                    <a:pt x="2396627" y="319103"/>
-                    <a:pt x="2361125" y="392084"/>
-                  </a:cubicBezTo>
-                  <a:cubicBezTo>
-                    <a:pt x="2218453" y="684005"/>
-                    <a:pt x="2011698" y="945211"/>
-                    <a:pt x="1768255" y="1167644"/>
-                  </a:cubicBezTo>
-                  <a:cubicBezTo>
-                    <a:pt x="1646250" y="1278860"/>
-                    <a:pt x="1514385" y="1380316"/>
-                    <a:pt x="1375125" y="1471474"/>
-                  </a:cubicBezTo>
-                  <a:cubicBezTo>
-                    <a:pt x="1235677" y="1562542"/>
-                    <a:pt x="1088928" y="1643672"/>
-                    <a:pt x="935735" y="1712713"/>
-                  </a:cubicBezTo>
-                  <a:cubicBezTo>
-                    <a:pt x="705659" y="1815533"/>
-                    <a:pt x="462359" y="1892212"/>
-                    <a:pt x="212353" y="1940294"/>
-                  </a:cubicBezTo>
-                  <a:lnTo>
-                    <a:pt x="0" y="1972702"/>
-                  </a:lnTo>
-                  <a:lnTo>
-                    <a:pt x="0" y="1732181"/>
-                  </a:lnTo>
-                  <a:lnTo>
-                    <a:pt x="161195" y="1706590"/>
-                  </a:lnTo>
-                  <a:cubicBezTo>
-                    <a:pt x="237638" y="1691378"/>
-                    <a:pt x="313477" y="1673222"/>
-                    <a:pt x="388463" y="1652268"/>
-                  </a:cubicBezTo>
-                  <a:cubicBezTo>
-                    <a:pt x="538529" y="1610539"/>
-                    <a:pt x="684898" y="1556543"/>
-                    <a:pt x="826716" y="1493950"/>
-                  </a:cubicBezTo>
-                  <a:cubicBezTo>
-                    <a:pt x="1111207" y="1370107"/>
-                    <a:pt x="1376832" y="1205881"/>
-                    <a:pt x="1609847" y="1007535"/>
-                  </a:cubicBezTo>
-                  <a:cubicBezTo>
-                    <a:pt x="1725975" y="908049"/>
-                    <a:pt x="1833571" y="799519"/>
-                    <a:pt x="1929982" y="682930"/>
-                  </a:cubicBezTo>
-                  <a:cubicBezTo>
-                    <a:pt x="2026581" y="566520"/>
-                    <a:pt x="2111806" y="441692"/>
-                    <a:pt x="2183093" y="310149"/>
-                  </a:cubicBezTo>
-                  <a:cubicBezTo>
-                    <a:pt x="2218738" y="244422"/>
-                    <a:pt x="2251396" y="177150"/>
-                    <a:pt x="2280286" y="108435"/>
-                  </a:cubicBezTo>
-                  <a:close/>
-                </a:path>
-              </a:pathLst>
-            </a:custGeom>
-            <a:gradFill>
-              <a:gsLst>
-                <a:gs pos="2000">
-                  <a:schemeClr val="bg1">
-                    <a:alpha val="10000"/>
-                  </a:schemeClr>
-                </a:gs>
-                <a:gs pos="16000">
-                  <a:schemeClr val="accent6">
-                    <a:alpha val="10000"/>
-                  </a:schemeClr>
-                </a:gs>
-                <a:gs pos="100000">
-                  <a:schemeClr val="bg1">
-                    <a:alpha val="10000"/>
-                  </a:schemeClr>
-                </a:gs>
-                <a:gs pos="85000">
-                  <a:schemeClr val="accent1">
-                    <a:alpha val="10000"/>
-                  </a:schemeClr>
-                </a:gs>
-              </a:gsLst>
-              <a:lin ang="12000000" scaled="0"/>
-            </a:gradFill>
-            <a:ln>
-              <a:noFill/>
-            </a:ln>
-          </p:spPr>
-          <p:style>
-            <a:lnRef idx="2">
-              <a:schemeClr val="accent1">
-                <a:shade val="50000"/>
-              </a:schemeClr>
-            </a:lnRef>
-            <a:fillRef idx="1">
-              <a:schemeClr val="accent1"/>
-            </a:fillRef>
-            <a:effectRef idx="0">
-              <a:schemeClr val="accent1"/>
-            </a:effectRef>
-            <a:fontRef idx="minor">
-              <a:schemeClr val="lt1"/>
-            </a:fontRef>
-          </p:style>
-          <p:txBody>
-            <a:bodyPr wrap="square" rtlCol="0" anchor="ctr">
-              <a:noAutofit/>
-            </a:bodyPr>
-            <a:lstStyle/>
-            <a:p>
-              <a:pPr algn="ctr"/>
-              <a:endParaRPr lang="en-US" sz="800" noProof="0" dirty="0"/>
-            </a:p>
-          </p:txBody>
-        </p:sp>
-        <p:sp>
-          <p:nvSpPr>
-            <p:cNvPr id="1041" name="Freeform: Shape 1040">
-              <a:extLst>
-                <a:ext uri="{FF2B5EF4-FFF2-40B4-BE49-F238E27FC236}">
-                  <a16:creationId xmlns:a16="http://schemas.microsoft.com/office/drawing/2014/main" id="{E228F5BA-5150-4554-B7EA-93F371F3B17C}"/>
-                </a:ext>
-                <a:ext uri="{C183D7F6-B498-43B3-948B-1728B52AA6E4}">
-                  <adec:decorative xmlns="" xmlns:adec="http://schemas.microsoft.com/office/drawing/2017/decorative" val="1"/>
-                </a:ext>
-              </a:extLst>
-            </p:cNvPr>
-            <p:cNvSpPr/>
-            <p:nvPr>
-              <p:extLst>
-                <p:ext uri="{386F3935-93C4-4BCD-93E2-E3B085C9AB24}">
-                  <p16:designElem xmlns:p16="http://schemas.microsoft.com/office/powerpoint/2015/main" val="1"/>
-                </p:ext>
-              </p:extLst>
-            </p:nvPr>
-          </p:nvSpPr>
-          <p:spPr>
-            <a:xfrm>
-              <a:off x="305" y="1"/>
-              <a:ext cx="2491105" cy="1943661"/>
-            </a:xfrm>
-            <a:custGeom>
-              <a:avLst/>
-              <a:gdLst>
-                <a:gd name="connsiteX0" fmla="*/ 1995408 w 2491105"/>
-                <a:gd name="connsiteY0" fmla="*/ 0 h 1943661"/>
-                <a:gd name="connsiteX1" fmla="*/ 2491105 w 2491105"/>
-                <a:gd name="connsiteY1" fmla="*/ 0 h 1943661"/>
-                <a:gd name="connsiteX2" fmla="*/ 2434705 w 2491105"/>
-                <a:gd name="connsiteY2" fmla="*/ 174009 h 1943661"/>
-                <a:gd name="connsiteX3" fmla="*/ 92457 w 2491105"/>
-                <a:gd name="connsiteY3" fmla="*/ 1931703 h 1943661"/>
-                <a:gd name="connsiteX4" fmla="*/ 0 w 2491105"/>
-                <a:gd name="connsiteY4" fmla="*/ 1943661 h 1943661"/>
-                <a:gd name="connsiteX5" fmla="*/ 0 w 2491105"/>
-                <a:gd name="connsiteY5" fmla="*/ 1491489 h 1943661"/>
-                <a:gd name="connsiteX6" fmla="*/ 34107 w 2491105"/>
-                <a:gd name="connsiteY6" fmla="*/ 1486836 h 1943661"/>
-                <a:gd name="connsiteX7" fmla="*/ 497577 w 2491105"/>
-                <a:gd name="connsiteY7" fmla="*/ 1360598 h 1943661"/>
-                <a:gd name="connsiteX8" fmla="*/ 1321566 w 2491105"/>
-                <a:gd name="connsiteY8" fmla="*/ 897645 h 1943661"/>
-                <a:gd name="connsiteX9" fmla="*/ 1891495 w 2491105"/>
-                <a:gd name="connsiteY9" fmla="*/ 230078 h 1943661"/>
-                <a:gd name="connsiteX10" fmla="*/ 1961469 w 2491105"/>
-                <a:gd name="connsiteY10" fmla="*/ 87885 h 1943661"/>
-              </a:gdLst>
-              <a:ahLst/>
-              <a:cxnLst>
-                <a:cxn ang="0">
-                  <a:pos x="connsiteX0" y="connsiteY0"/>
-                </a:cxn>
-                <a:cxn ang="0">
-                  <a:pos x="connsiteX1" y="connsiteY1"/>
-                </a:cxn>
-                <a:cxn ang="0">
-                  <a:pos x="connsiteX2" y="connsiteY2"/>
-                </a:cxn>
-                <a:cxn ang="0">
-                  <a:pos x="connsiteX3" y="connsiteY3"/>
-                </a:cxn>
-                <a:cxn ang="0">
-                  <a:pos x="connsiteX4" y="connsiteY4"/>
-                </a:cxn>
-                <a:cxn ang="0">
-                  <a:pos x="connsiteX5" y="connsiteY5"/>
-                </a:cxn>
-                <a:cxn ang="0">
-                  <a:pos x="connsiteX6" y="connsiteY6"/>
-                </a:cxn>
-                <a:cxn ang="0">
-                  <a:pos x="connsiteX7" y="connsiteY7"/>
-                </a:cxn>
-                <a:cxn ang="0">
-                  <a:pos x="connsiteX8" y="connsiteY8"/>
-                </a:cxn>
-                <a:cxn ang="0">
-                  <a:pos x="connsiteX9" y="connsiteY9"/>
-                </a:cxn>
-                <a:cxn ang="0">
-                  <a:pos x="connsiteX10" y="connsiteY10"/>
-                </a:cxn>
-              </a:cxnLst>
-              <a:rect l="l" t="t" r="r" b="b"/>
-              <a:pathLst>
-                <a:path w="2491105" h="1943661">
-                  <a:moveTo>
-                    <a:pt x="1995408" y="0"/>
-                  </a:moveTo>
-                  <a:lnTo>
-                    <a:pt x="2491105" y="0"/>
-                  </a:lnTo>
-                  <a:lnTo>
-                    <a:pt x="2434705" y="174009"/>
-                  </a:lnTo>
-                  <a:cubicBezTo>
-                    <a:pt x="2087512" y="1067655"/>
-                    <a:pt x="1129122" y="1753877"/>
-                    <a:pt x="92457" y="1931703"/>
-                  </a:cubicBezTo>
-                  <a:lnTo>
-                    <a:pt x="0" y="1943661"/>
-                  </a:lnTo>
-                  <a:lnTo>
-                    <a:pt x="0" y="1491489"/>
-                  </a:lnTo>
-                  <a:lnTo>
-                    <a:pt x="34107" y="1486836"/>
-                  </a:lnTo>
-                  <a:cubicBezTo>
-                    <a:pt x="189055" y="1458696"/>
-                    <a:pt x="343908" y="1416565"/>
-                    <a:pt x="497577" y="1360598"/>
-                  </a:cubicBezTo>
-                  <a:cubicBezTo>
-                    <a:pt x="796856" y="1251889"/>
-                    <a:pt x="1081725" y="1091781"/>
-                    <a:pt x="1321566" y="897645"/>
-                  </a:cubicBezTo>
-                  <a:cubicBezTo>
-                    <a:pt x="1565577" y="700195"/>
-                    <a:pt x="1757355" y="475523"/>
-                    <a:pt x="1891495" y="230078"/>
-                  </a:cubicBezTo>
-                  <a:cubicBezTo>
-                    <a:pt x="1917197" y="183033"/>
-                    <a:pt x="1940526" y="135619"/>
-                    <a:pt x="1961469" y="87885"/>
-                  </a:cubicBezTo>
-                  <a:close/>
-                </a:path>
-              </a:pathLst>
-            </a:custGeom>
-            <a:gradFill>
-              <a:gsLst>
-                <a:gs pos="2000">
-                  <a:schemeClr val="bg1">
-                    <a:alpha val="10000"/>
-                  </a:schemeClr>
-                </a:gs>
-                <a:gs pos="16000">
-                  <a:schemeClr val="accent6">
-                    <a:alpha val="10000"/>
-                  </a:schemeClr>
-                </a:gs>
-                <a:gs pos="100000">
-                  <a:schemeClr val="bg1">
-                    <a:alpha val="10000"/>
-                  </a:schemeClr>
-                </a:gs>
-                <a:gs pos="85000">
-                  <a:schemeClr val="accent1">
-                    <a:alpha val="10000"/>
-                  </a:schemeClr>
-                </a:gs>
-              </a:gsLst>
-              <a:lin ang="12000000" scaled="0"/>
-            </a:gradFill>
-            <a:ln>
-              <a:noFill/>
-            </a:ln>
-          </p:spPr>
-          <p:style>
-            <a:lnRef idx="2">
-              <a:schemeClr val="accent1">
-                <a:shade val="50000"/>
-              </a:schemeClr>
-            </a:lnRef>
-            <a:fillRef idx="1">
-              <a:schemeClr val="accent1"/>
-            </a:fillRef>
-            <a:effectRef idx="0">
-              <a:schemeClr val="accent1"/>
-            </a:effectRef>
-            <a:fontRef idx="minor">
-              <a:schemeClr val="lt1"/>
-            </a:fontRef>
-          </p:style>
-          <p:txBody>
-            <a:bodyPr rtlCol="0" anchor="ctr"/>
-            <a:lstStyle/>
-            <a:p>
-              <a:pPr algn="ctr"/>
-              <a:endParaRPr lang="en-US" noProof="0" dirty="0"/>
-            </a:p>
-          </p:txBody>
-        </p:sp>
-      </p:grpSp>
       <p:pic>
         <p:nvPicPr>
           <p:cNvPr id="1028" name="Picture 4" descr="Forma&#10;&#10;El contenido generado por IA puede ser incorrecto.">
@@ -4726,7 +3534,7 @@
         </p:blipFill>
         <p:spPr bwMode="auto">
           <a:xfrm>
-            <a:off x="3319641" y="830001"/>
+            <a:off x="3319641" y="489292"/>
             <a:ext cx="5513278" cy="1419669"/>
           </a:xfrm>
           <a:prstGeom prst="rect">
@@ -4744,1266 +3552,184 @@
           </a:extLst>
         </p:spPr>
       </p:pic>
-      <p:grpSp>
-        <p:nvGrpSpPr>
-          <p:cNvPr id="1043" name="Group 1042">
-            <a:extLst>
-              <a:ext uri="{FF2B5EF4-FFF2-40B4-BE49-F238E27FC236}">
-                <a16:creationId xmlns:a16="http://schemas.microsoft.com/office/drawing/2014/main" id="{383C2651-AE0C-4AE4-8725-E2F9414FE219}"/>
-              </a:ext>
-              <a:ext uri="{C183D7F6-B498-43B3-948B-1728B52AA6E4}">
-                <adec:decorative xmlns="" xmlns:adec="http://schemas.microsoft.com/office/drawing/2017/decorative" val="1"/>
-              </a:ext>
-            </a:extLst>
-          </p:cNvPr>
-          <p:cNvGrpSpPr>
-            <a:grpSpLocks noGrp="1" noUngrp="1" noRot="1" noChangeAspect="1" noMove="1" noResize="1"/>
-          </p:cNvGrpSpPr>
-          <p:nvPr>
-            <p:extLst>
-              <p:ext uri="{386F3935-93C4-4BCD-93E2-E3B085C9AB24}">
-                <p16:designElem xmlns:p16="http://schemas.microsoft.com/office/powerpoint/2015/main" val="1"/>
-              </p:ext>
-            </p:extLst>
-          </p:nvPr>
-        </p:nvGrpSpPr>
-        <p:grpSpPr>
-          <a:xfrm rot="10800000" flipH="1">
-            <a:off x="-305" y="4322879"/>
-            <a:ext cx="3378428" cy="2535121"/>
-            <a:chOff x="-305" y="-1"/>
-            <a:chExt cx="3832880" cy="2876136"/>
+      <p:pic>
+        <p:nvPicPr>
+          <p:cNvPr id="4" name="Imagen 3" descr="Imagen que contiene dibujo, jugador, pelota&#10;&#10;El contenido generado por IA puede ser incorrecto.">
+            <a:extLst>
+              <a:ext uri="{FF2B5EF4-FFF2-40B4-BE49-F238E27FC236}">
+                <a16:creationId xmlns:a16="http://schemas.microsoft.com/office/drawing/2014/main" id="{8EA9759C-DE19-FFFD-4F69-C3AFF69C034F}"/>
+              </a:ext>
+            </a:extLst>
+          </p:cNvPr>
+          <p:cNvPicPr>
+            <a:picLocks noChangeAspect="1"/>
+          </p:cNvPicPr>
+          <p:nvPr/>
+        </p:nvPicPr>
+        <p:blipFill>
+          <a:blip r:embed="rId3">
+            <a:extLst>
+              <a:ext uri="{28A0092B-C50C-407E-A947-70E740481C1C}">
+                <a14:useLocalDpi xmlns:a14="http://schemas.microsoft.com/office/drawing/2010/main" val="0"/>
+              </a:ext>
+            </a:extLst>
+          </a:blip>
+          <a:stretch>
+            <a:fillRect/>
+          </a:stretch>
+        </p:blipFill>
+        <p:spPr>
+          <a:xfrm>
+            <a:off x="8832919" y="5511443"/>
+            <a:ext cx="1649058" cy="299508"/>
           </a:xfrm>
-        </p:grpSpPr>
-        <p:sp>
-          <p:nvSpPr>
-            <p:cNvPr id="1044" name="Freeform: Shape 1043">
-              <a:extLst>
-                <a:ext uri="{FF2B5EF4-FFF2-40B4-BE49-F238E27FC236}">
-                  <a16:creationId xmlns:a16="http://schemas.microsoft.com/office/drawing/2014/main" id="{CCE13265-B5D2-47B4-A199-E05F390D5B9C}"/>
-                </a:ext>
-                <a:ext uri="{C183D7F6-B498-43B3-948B-1728B52AA6E4}">
-                  <adec:decorative xmlns="" xmlns:adec="http://schemas.microsoft.com/office/drawing/2017/decorative" val="1"/>
-                </a:ext>
-              </a:extLst>
-            </p:cNvPr>
-            <p:cNvSpPr/>
-            <p:nvPr>
-              <p:extLst>
-                <p:ext uri="{386F3935-93C4-4BCD-93E2-E3B085C9AB24}">
-                  <p16:designElem xmlns:p16="http://schemas.microsoft.com/office/powerpoint/2015/main" val="1"/>
-                </p:ext>
-              </p:extLst>
-            </p:nvPr>
-          </p:nvSpPr>
-          <p:spPr>
-            <a:xfrm>
-              <a:off x="305" y="1"/>
-              <a:ext cx="3815424" cy="2653659"/>
-            </a:xfrm>
-            <a:custGeom>
-              <a:avLst/>
-              <a:gdLst>
-                <a:gd name="connsiteX0" fmla="*/ 3203055 w 3815424"/>
-                <a:gd name="connsiteY0" fmla="*/ 0 h 2653659"/>
-                <a:gd name="connsiteX1" fmla="*/ 3815424 w 3815424"/>
-                <a:gd name="connsiteY1" fmla="*/ 0 h 2653659"/>
-                <a:gd name="connsiteX2" fmla="*/ 3801025 w 3815424"/>
-                <a:gd name="connsiteY2" fmla="*/ 214243 h 2653659"/>
-                <a:gd name="connsiteX3" fmla="*/ 587142 w 3815424"/>
-                <a:gd name="connsiteY3" fmla="*/ 2653659 h 2653659"/>
-                <a:gd name="connsiteX4" fmla="*/ 53389 w 3815424"/>
-                <a:gd name="connsiteY4" fmla="*/ 2605041 h 2653659"/>
-                <a:gd name="connsiteX5" fmla="*/ 0 w 3815424"/>
-                <a:gd name="connsiteY5" fmla="*/ 2593136 h 2653659"/>
-                <a:gd name="connsiteX6" fmla="*/ 0 w 3815424"/>
-                <a:gd name="connsiteY6" fmla="*/ 1994836 h 2653659"/>
-                <a:gd name="connsiteX7" fmla="*/ 159710 w 3815424"/>
-                <a:gd name="connsiteY7" fmla="*/ 2035054 h 2653659"/>
-                <a:gd name="connsiteX8" fmla="*/ 587142 w 3815424"/>
-                <a:gd name="connsiteY8" fmla="*/ 2075152 h 2653659"/>
-                <a:gd name="connsiteX9" fmla="*/ 1549283 w 3815424"/>
-                <a:gd name="connsiteY9" fmla="*/ 1900153 h 2653659"/>
-                <a:gd name="connsiteX10" fmla="*/ 2406698 w 3815424"/>
-                <a:gd name="connsiteY10" fmla="*/ 1418450 h 2653659"/>
-                <a:gd name="connsiteX11" fmla="*/ 2996069 w 3815424"/>
-                <a:gd name="connsiteY11" fmla="*/ 728678 h 2653659"/>
-                <a:gd name="connsiteX12" fmla="*/ 3193967 w 3815424"/>
-                <a:gd name="connsiteY12" fmla="*/ 137719 h 2653659"/>
-              </a:gdLst>
-              <a:ahLst/>
-              <a:cxnLst>
-                <a:cxn ang="0">
-                  <a:pos x="connsiteX0" y="connsiteY0"/>
-                </a:cxn>
-                <a:cxn ang="0">
-                  <a:pos x="connsiteX1" y="connsiteY1"/>
-                </a:cxn>
-                <a:cxn ang="0">
-                  <a:pos x="connsiteX2" y="connsiteY2"/>
-                </a:cxn>
-                <a:cxn ang="0">
-                  <a:pos x="connsiteX3" y="connsiteY3"/>
-                </a:cxn>
-                <a:cxn ang="0">
-                  <a:pos x="connsiteX4" y="connsiteY4"/>
-                </a:cxn>
-                <a:cxn ang="0">
-                  <a:pos x="connsiteX5" y="connsiteY5"/>
-                </a:cxn>
-                <a:cxn ang="0">
-                  <a:pos x="connsiteX6" y="connsiteY6"/>
-                </a:cxn>
-                <a:cxn ang="0">
-                  <a:pos x="connsiteX7" y="connsiteY7"/>
-                </a:cxn>
-                <a:cxn ang="0">
-                  <a:pos x="connsiteX8" y="connsiteY8"/>
-                </a:cxn>
-                <a:cxn ang="0">
-                  <a:pos x="connsiteX9" y="connsiteY9"/>
-                </a:cxn>
-                <a:cxn ang="0">
-                  <a:pos x="connsiteX10" y="connsiteY10"/>
-                </a:cxn>
-                <a:cxn ang="0">
-                  <a:pos x="connsiteX11" y="connsiteY11"/>
-                </a:cxn>
-                <a:cxn ang="0">
-                  <a:pos x="connsiteX12" y="connsiteY12"/>
-                </a:cxn>
-              </a:cxnLst>
-              <a:rect l="l" t="t" r="r" b="b"/>
-              <a:pathLst>
-                <a:path w="3815424" h="2653659">
-                  <a:moveTo>
-                    <a:pt x="3203055" y="0"/>
-                  </a:moveTo>
-                  <a:lnTo>
-                    <a:pt x="3815424" y="0"/>
-                  </a:lnTo>
-                  <a:lnTo>
-                    <a:pt x="3801025" y="214243"/>
-                  </a:lnTo>
-                  <a:cubicBezTo>
-                    <a:pt x="3616317" y="1584467"/>
-                    <a:pt x="2091637" y="2653659"/>
-                    <a:pt x="587142" y="2653659"/>
-                  </a:cubicBezTo>
-                  <a:cubicBezTo>
-                    <a:pt x="400192" y="2653659"/>
-                    <a:pt x="222112" y="2636953"/>
-                    <a:pt x="53389" y="2605041"/>
-                  </a:cubicBezTo>
-                  <a:lnTo>
-                    <a:pt x="0" y="2593136"/>
-                  </a:lnTo>
-                  <a:lnTo>
-                    <a:pt x="0" y="1994836"/>
-                  </a:lnTo>
-                  <a:lnTo>
-                    <a:pt x="159710" y="2035054"/>
-                  </a:lnTo>
-                  <a:cubicBezTo>
-                    <a:pt x="295467" y="2061726"/>
-                    <a:pt x="438268" y="2075152"/>
-                    <a:pt x="587142" y="2075152"/>
-                  </a:cubicBezTo>
-                  <a:cubicBezTo>
-                    <a:pt x="901731" y="2075152"/>
-                    <a:pt x="1234490" y="2014697"/>
-                    <a:pt x="1549283" y="1900153"/>
-                  </a:cubicBezTo>
-                  <a:cubicBezTo>
-                    <a:pt x="1860709" y="1786959"/>
-                    <a:pt x="2157231" y="1620350"/>
-                    <a:pt x="2406698" y="1418450"/>
-                  </a:cubicBezTo>
-                  <a:cubicBezTo>
-                    <a:pt x="2655859" y="1216840"/>
-                    <a:pt x="2859596" y="978302"/>
-                    <a:pt x="2996069" y="728678"/>
-                  </a:cubicBezTo>
-                  <a:cubicBezTo>
-                    <a:pt x="3101178" y="536396"/>
-                    <a:pt x="3167417" y="338366"/>
-                    <a:pt x="3193967" y="137719"/>
-                  </a:cubicBezTo>
-                  <a:close/>
-                </a:path>
-              </a:pathLst>
-            </a:custGeom>
-            <a:gradFill>
-              <a:gsLst>
-                <a:gs pos="2000">
-                  <a:schemeClr val="bg1">
-                    <a:alpha val="10000"/>
-                  </a:schemeClr>
-                </a:gs>
-                <a:gs pos="16000">
-                  <a:schemeClr val="accent6">
-                    <a:alpha val="10000"/>
-                  </a:schemeClr>
-                </a:gs>
-                <a:gs pos="100000">
-                  <a:schemeClr val="bg1">
-                    <a:alpha val="10000"/>
-                  </a:schemeClr>
-                </a:gs>
-                <a:gs pos="85000">
-                  <a:schemeClr val="accent1">
-                    <a:alpha val="10000"/>
-                  </a:schemeClr>
-                </a:gs>
-              </a:gsLst>
-              <a:lin ang="12000000" scaled="0"/>
-            </a:gradFill>
-            <a:ln>
-              <a:noFill/>
-            </a:ln>
-          </p:spPr>
-          <p:style>
-            <a:lnRef idx="2">
-              <a:schemeClr val="accent1">
-                <a:shade val="50000"/>
-              </a:schemeClr>
-            </a:lnRef>
-            <a:fillRef idx="1">
-              <a:schemeClr val="accent1"/>
-            </a:fillRef>
-            <a:effectRef idx="0">
-              <a:schemeClr val="accent1"/>
-            </a:effectRef>
-            <a:fontRef idx="minor">
-              <a:schemeClr val="lt1"/>
-            </a:fontRef>
-          </p:style>
-          <p:txBody>
-            <a:bodyPr rtlCol="0" anchor="ctr"/>
-            <a:lstStyle/>
-            <a:p>
-              <a:pPr algn="ctr"/>
-              <a:endParaRPr lang="en-US" noProof="0" dirty="0"/>
-            </a:p>
-          </p:txBody>
-        </p:sp>
-        <p:sp>
-          <p:nvSpPr>
-            <p:cNvPr id="1045" name="Freeform: Shape 1044">
-              <a:extLst>
-                <a:ext uri="{FF2B5EF4-FFF2-40B4-BE49-F238E27FC236}">
-                  <a16:creationId xmlns:a16="http://schemas.microsoft.com/office/drawing/2014/main" id="{693EBD03-D832-462C-9304-7273698ED4FE}"/>
-                </a:ext>
-                <a:ext uri="{C183D7F6-B498-43B3-948B-1728B52AA6E4}">
-                  <adec:decorative xmlns="" xmlns:adec="http://schemas.microsoft.com/office/drawing/2017/decorative" val="1"/>
-                </a:ext>
-              </a:extLst>
-            </p:cNvPr>
-            <p:cNvSpPr/>
-            <p:nvPr>
-              <p:extLst>
-                <p:ext uri="{386F3935-93C4-4BCD-93E2-E3B085C9AB24}">
-                  <p16:designElem xmlns:p16="http://schemas.microsoft.com/office/powerpoint/2015/main" val="1"/>
-                </p:ext>
-              </p:extLst>
-            </p:nvPr>
-          </p:nvSpPr>
-          <p:spPr>
-            <a:xfrm>
-              <a:off x="305" y="-1"/>
-              <a:ext cx="3815424" cy="2653660"/>
-            </a:xfrm>
-            <a:custGeom>
-              <a:avLst/>
-              <a:gdLst>
-                <a:gd name="connsiteX0" fmla="*/ 3305038 w 3815424"/>
-                <a:gd name="connsiteY0" fmla="*/ 0 h 2653660"/>
-                <a:gd name="connsiteX1" fmla="*/ 3815424 w 3815424"/>
-                <a:gd name="connsiteY1" fmla="*/ 0 h 2653660"/>
-                <a:gd name="connsiteX2" fmla="*/ 3801025 w 3815424"/>
-                <a:gd name="connsiteY2" fmla="*/ 214244 h 2653660"/>
-                <a:gd name="connsiteX3" fmla="*/ 587142 w 3815424"/>
-                <a:gd name="connsiteY3" fmla="*/ 2653660 h 2653660"/>
-                <a:gd name="connsiteX4" fmla="*/ 53389 w 3815424"/>
-                <a:gd name="connsiteY4" fmla="*/ 2605042 h 2653660"/>
-                <a:gd name="connsiteX5" fmla="*/ 0 w 3815424"/>
-                <a:gd name="connsiteY5" fmla="*/ 2593137 h 2653660"/>
-                <a:gd name="connsiteX6" fmla="*/ 0 w 3815424"/>
-                <a:gd name="connsiteY6" fmla="*/ 2094444 h 2653660"/>
-                <a:gd name="connsiteX7" fmla="*/ 137675 w 3815424"/>
-                <a:gd name="connsiteY7" fmla="*/ 2129195 h 2653660"/>
-                <a:gd name="connsiteX8" fmla="*/ 587142 w 3815424"/>
-                <a:gd name="connsiteY8" fmla="*/ 2171571 h 2653660"/>
-                <a:gd name="connsiteX9" fmla="*/ 1585826 w 3815424"/>
-                <a:gd name="connsiteY9" fmla="*/ 1990112 h 2653660"/>
-                <a:gd name="connsiteX10" fmla="*/ 2473046 w 3815424"/>
-                <a:gd name="connsiteY10" fmla="*/ 1491633 h 2653660"/>
-                <a:gd name="connsiteX11" fmla="*/ 3086710 w 3815424"/>
-                <a:gd name="connsiteY11" fmla="*/ 772838 h 2653660"/>
-                <a:gd name="connsiteX12" fmla="*/ 3295217 w 3815424"/>
-                <a:gd name="connsiteY12" fmla="*/ 149229 h 2653660"/>
-              </a:gdLst>
-              <a:ahLst/>
-              <a:cxnLst>
-                <a:cxn ang="0">
-                  <a:pos x="connsiteX0" y="connsiteY0"/>
-                </a:cxn>
-                <a:cxn ang="0">
-                  <a:pos x="connsiteX1" y="connsiteY1"/>
-                </a:cxn>
-                <a:cxn ang="0">
-                  <a:pos x="connsiteX2" y="connsiteY2"/>
-                </a:cxn>
-                <a:cxn ang="0">
-                  <a:pos x="connsiteX3" y="connsiteY3"/>
-                </a:cxn>
-                <a:cxn ang="0">
-                  <a:pos x="connsiteX4" y="connsiteY4"/>
-                </a:cxn>
-                <a:cxn ang="0">
-                  <a:pos x="connsiteX5" y="connsiteY5"/>
-                </a:cxn>
-                <a:cxn ang="0">
-                  <a:pos x="connsiteX6" y="connsiteY6"/>
-                </a:cxn>
-                <a:cxn ang="0">
-                  <a:pos x="connsiteX7" y="connsiteY7"/>
-                </a:cxn>
-                <a:cxn ang="0">
-                  <a:pos x="connsiteX8" y="connsiteY8"/>
-                </a:cxn>
-                <a:cxn ang="0">
-                  <a:pos x="connsiteX9" y="connsiteY9"/>
-                </a:cxn>
-                <a:cxn ang="0">
-                  <a:pos x="connsiteX10" y="connsiteY10"/>
-                </a:cxn>
-                <a:cxn ang="0">
-                  <a:pos x="connsiteX11" y="connsiteY11"/>
-                </a:cxn>
-                <a:cxn ang="0">
-                  <a:pos x="connsiteX12" y="connsiteY12"/>
-                </a:cxn>
-              </a:cxnLst>
-              <a:rect l="l" t="t" r="r" b="b"/>
-              <a:pathLst>
-                <a:path w="3815424" h="2653660">
-                  <a:moveTo>
-                    <a:pt x="3305038" y="0"/>
-                  </a:moveTo>
-                  <a:lnTo>
-                    <a:pt x="3815424" y="0"/>
-                  </a:lnTo>
-                  <a:lnTo>
-                    <a:pt x="3801025" y="214244"/>
-                  </a:lnTo>
-                  <a:cubicBezTo>
-                    <a:pt x="3616317" y="1584467"/>
-                    <a:pt x="2091637" y="2653660"/>
-                    <a:pt x="587142" y="2653660"/>
-                  </a:cubicBezTo>
-                  <a:cubicBezTo>
-                    <a:pt x="400192" y="2653660"/>
-                    <a:pt x="222112" y="2636954"/>
-                    <a:pt x="53389" y="2605042"/>
-                  </a:cubicBezTo>
-                  <a:lnTo>
-                    <a:pt x="0" y="2593137"/>
-                  </a:lnTo>
-                  <a:lnTo>
-                    <a:pt x="0" y="2094444"/>
-                  </a:lnTo>
-                  <a:lnTo>
-                    <a:pt x="137675" y="2129195"/>
-                  </a:lnTo>
-                  <a:cubicBezTo>
-                    <a:pt x="280616" y="2157374"/>
-                    <a:pt x="430766" y="2171571"/>
-                    <a:pt x="587142" y="2171571"/>
-                  </a:cubicBezTo>
-                  <a:cubicBezTo>
-                    <a:pt x="918879" y="2171571"/>
-                    <a:pt x="1254904" y="2110634"/>
-                    <a:pt x="1585826" y="1990112"/>
-                  </a:cubicBezTo>
-                  <a:cubicBezTo>
-                    <a:pt x="1908071" y="1873061"/>
-                    <a:pt x="2214800" y="1700666"/>
-                    <a:pt x="2473046" y="1491633"/>
-                  </a:cubicBezTo>
-                  <a:cubicBezTo>
-                    <a:pt x="2735782" y="1279031"/>
-                    <a:pt x="2942276" y="1037118"/>
-                    <a:pt x="3086710" y="772838"/>
-                  </a:cubicBezTo>
-                  <a:cubicBezTo>
-                    <a:pt x="3197408" y="570216"/>
-                    <a:pt x="3267226" y="361248"/>
-                    <a:pt x="3295217" y="149229"/>
-                  </a:cubicBezTo>
-                  <a:close/>
-                </a:path>
-              </a:pathLst>
-            </a:custGeom>
-            <a:gradFill>
-              <a:gsLst>
-                <a:gs pos="2000">
-                  <a:schemeClr val="bg1">
-                    <a:alpha val="10000"/>
-                  </a:schemeClr>
-                </a:gs>
-                <a:gs pos="16000">
-                  <a:schemeClr val="accent6">
-                    <a:alpha val="10000"/>
-                  </a:schemeClr>
-                </a:gs>
-                <a:gs pos="100000">
-                  <a:schemeClr val="bg1">
-                    <a:alpha val="10000"/>
-                  </a:schemeClr>
-                </a:gs>
-                <a:gs pos="85000">
-                  <a:schemeClr val="accent1">
-                    <a:alpha val="10000"/>
-                  </a:schemeClr>
-                </a:gs>
-              </a:gsLst>
-              <a:lin ang="12000000" scaled="0"/>
-            </a:gradFill>
-            <a:ln>
-              <a:noFill/>
-            </a:ln>
-          </p:spPr>
-          <p:style>
-            <a:lnRef idx="2">
-              <a:schemeClr val="accent1">
-                <a:shade val="50000"/>
-              </a:schemeClr>
-            </a:lnRef>
-            <a:fillRef idx="1">
-              <a:schemeClr val="accent1"/>
-            </a:fillRef>
-            <a:effectRef idx="0">
-              <a:schemeClr val="accent1"/>
-            </a:effectRef>
-            <a:fontRef idx="minor">
-              <a:schemeClr val="lt1"/>
-            </a:fontRef>
-          </p:style>
-          <p:txBody>
-            <a:bodyPr rtlCol="0" anchor="ctr"/>
-            <a:lstStyle/>
-            <a:p>
-              <a:pPr algn="ctr"/>
-              <a:endParaRPr lang="en-US" noProof="0" dirty="0"/>
-            </a:p>
-          </p:txBody>
-        </p:sp>
-        <p:sp>
-          <p:nvSpPr>
-            <p:cNvPr id="1046" name="Freeform: Shape 1045">
-              <a:extLst>
-                <a:ext uri="{FF2B5EF4-FFF2-40B4-BE49-F238E27FC236}">
-                  <a16:creationId xmlns:a16="http://schemas.microsoft.com/office/drawing/2014/main" id="{0D53D3E2-805E-40D2-964F-352BF6D476B6}"/>
-                </a:ext>
-                <a:ext uri="{C183D7F6-B498-43B3-948B-1728B52AA6E4}">
-                  <adec:decorative xmlns="" xmlns:adec="http://schemas.microsoft.com/office/drawing/2017/decorative" val="1"/>
-                </a:ext>
-              </a:extLst>
-            </p:cNvPr>
-            <p:cNvSpPr/>
-            <p:nvPr>
-              <p:extLst>
-                <p:ext uri="{386F3935-93C4-4BCD-93E2-E3B085C9AB24}">
-                  <p16:designElem xmlns:p16="http://schemas.microsoft.com/office/powerpoint/2015/main" val="1"/>
-                </p:ext>
-              </p:extLst>
-            </p:nvPr>
-          </p:nvSpPr>
-          <p:spPr>
-            <a:xfrm>
-              <a:off x="-305" y="1"/>
-              <a:ext cx="3815986" cy="2675935"/>
-            </a:xfrm>
-            <a:custGeom>
-              <a:avLst/>
-              <a:gdLst>
-                <a:gd name="connsiteX0" fmla="*/ 3648768 w 3815986"/>
-                <a:gd name="connsiteY0" fmla="*/ 0 h 2675935"/>
-                <a:gd name="connsiteX1" fmla="*/ 3815986 w 3815986"/>
-                <a:gd name="connsiteY1" fmla="*/ 0 h 2675935"/>
-                <a:gd name="connsiteX2" fmla="*/ 3804695 w 3815986"/>
-                <a:gd name="connsiteY2" fmla="*/ 200084 h 2675935"/>
-                <a:gd name="connsiteX3" fmla="*/ 3762590 w 3815986"/>
-                <a:gd name="connsiteY3" fmla="*/ 455543 h 2675935"/>
-                <a:gd name="connsiteX4" fmla="*/ 3592332 w 3815986"/>
-                <a:gd name="connsiteY4" fmla="*/ 947274 h 2675935"/>
-                <a:gd name="connsiteX5" fmla="*/ 2953967 w 3815986"/>
-                <a:gd name="connsiteY5" fmla="*/ 1782349 h 2675935"/>
-                <a:gd name="connsiteX6" fmla="*/ 2530669 w 3815986"/>
-                <a:gd name="connsiteY6" fmla="*/ 2109494 h 2675935"/>
-                <a:gd name="connsiteX7" fmla="*/ 2057561 w 3815986"/>
-                <a:gd name="connsiteY7" fmla="*/ 2369245 h 2675935"/>
-                <a:gd name="connsiteX8" fmla="*/ 1007330 w 3815986"/>
-                <a:gd name="connsiteY8" fmla="*/ 2655701 h 2675935"/>
-                <a:gd name="connsiteX9" fmla="*/ 732765 w 3815986"/>
-                <a:gd name="connsiteY9" fmla="*/ 2674696 h 2675935"/>
-                <a:gd name="connsiteX10" fmla="*/ 457666 w 3815986"/>
-                <a:gd name="connsiteY10" fmla="*/ 2670839 h 2675935"/>
-                <a:gd name="connsiteX11" fmla="*/ 183574 w 3815986"/>
-                <a:gd name="connsiteY11" fmla="*/ 2643312 h 2675935"/>
-                <a:gd name="connsiteX12" fmla="*/ 0 w 3815986"/>
-                <a:gd name="connsiteY12" fmla="*/ 2607798 h 2675935"/>
-                <a:gd name="connsiteX13" fmla="*/ 0 w 3815986"/>
-                <a:gd name="connsiteY13" fmla="*/ 2356652 h 2675935"/>
-                <a:gd name="connsiteX14" fmla="*/ 222195 w 3815986"/>
-                <a:gd name="connsiteY14" fmla="*/ 2396940 h 2675935"/>
-                <a:gd name="connsiteX15" fmla="*/ 472364 w 3815986"/>
-                <a:gd name="connsiteY15" fmla="*/ 2419092 h 2675935"/>
-                <a:gd name="connsiteX16" fmla="*/ 974972 w 3815986"/>
-                <a:gd name="connsiteY16" fmla="*/ 2402122 h 2675935"/>
-                <a:gd name="connsiteX17" fmla="*/ 1468292 w 3815986"/>
-                <a:gd name="connsiteY17" fmla="*/ 2304162 h 2675935"/>
-                <a:gd name="connsiteX18" fmla="*/ 1940176 w 3815986"/>
-                <a:gd name="connsiteY18" fmla="*/ 2133695 h 2675935"/>
-                <a:gd name="connsiteX19" fmla="*/ 2783403 w 3815986"/>
-                <a:gd name="connsiteY19" fmla="*/ 1609954 h 2675935"/>
-                <a:gd name="connsiteX20" fmla="*/ 3128104 w 3815986"/>
-                <a:gd name="connsiteY20" fmla="*/ 1260439 h 2675935"/>
-                <a:gd name="connsiteX21" fmla="*/ 3400639 w 3815986"/>
-                <a:gd name="connsiteY21" fmla="*/ 859052 h 2675935"/>
-                <a:gd name="connsiteX22" fmla="*/ 3585595 w 3815986"/>
-                <a:gd name="connsiteY22" fmla="*/ 415336 h 2675935"/>
-                <a:gd name="connsiteX23" fmla="*/ 3635918 w 3815986"/>
-                <a:gd name="connsiteY23" fmla="*/ 181137 h 2675935"/>
-              </a:gdLst>
-              <a:ahLst/>
-              <a:cxnLst>
-                <a:cxn ang="0">
-                  <a:pos x="connsiteX0" y="connsiteY0"/>
-                </a:cxn>
-                <a:cxn ang="0">
-                  <a:pos x="connsiteX1" y="connsiteY1"/>
-                </a:cxn>
-                <a:cxn ang="0">
-                  <a:pos x="connsiteX2" y="connsiteY2"/>
-                </a:cxn>
-                <a:cxn ang="0">
-                  <a:pos x="connsiteX3" y="connsiteY3"/>
-                </a:cxn>
-                <a:cxn ang="0">
-                  <a:pos x="connsiteX4" y="connsiteY4"/>
-                </a:cxn>
-                <a:cxn ang="0">
-                  <a:pos x="connsiteX5" y="connsiteY5"/>
-                </a:cxn>
-                <a:cxn ang="0">
-                  <a:pos x="connsiteX6" y="connsiteY6"/>
-                </a:cxn>
-                <a:cxn ang="0">
-                  <a:pos x="connsiteX7" y="connsiteY7"/>
-                </a:cxn>
-                <a:cxn ang="0">
-                  <a:pos x="connsiteX8" y="connsiteY8"/>
-                </a:cxn>
-                <a:cxn ang="0">
-                  <a:pos x="connsiteX9" y="connsiteY9"/>
-                </a:cxn>
-                <a:cxn ang="0">
-                  <a:pos x="connsiteX10" y="connsiteY10"/>
-                </a:cxn>
-                <a:cxn ang="0">
-                  <a:pos x="connsiteX11" y="connsiteY11"/>
-                </a:cxn>
-                <a:cxn ang="0">
-                  <a:pos x="connsiteX12" y="connsiteY12"/>
-                </a:cxn>
-                <a:cxn ang="0">
-                  <a:pos x="connsiteX13" y="connsiteY13"/>
-                </a:cxn>
-                <a:cxn ang="0">
-                  <a:pos x="connsiteX14" y="connsiteY14"/>
-                </a:cxn>
-                <a:cxn ang="0">
-                  <a:pos x="connsiteX15" y="connsiteY15"/>
-                </a:cxn>
-                <a:cxn ang="0">
-                  <a:pos x="connsiteX16" y="connsiteY16"/>
-                </a:cxn>
-                <a:cxn ang="0">
-                  <a:pos x="connsiteX17" y="connsiteY17"/>
-                </a:cxn>
-                <a:cxn ang="0">
-                  <a:pos x="connsiteX18" y="connsiteY18"/>
-                </a:cxn>
-                <a:cxn ang="0">
-                  <a:pos x="connsiteX19" y="connsiteY19"/>
-                </a:cxn>
-                <a:cxn ang="0">
-                  <a:pos x="connsiteX20" y="connsiteY20"/>
-                </a:cxn>
-                <a:cxn ang="0">
-                  <a:pos x="connsiteX21" y="connsiteY21"/>
-                </a:cxn>
-                <a:cxn ang="0">
-                  <a:pos x="connsiteX22" y="connsiteY22"/>
-                </a:cxn>
-                <a:cxn ang="0">
-                  <a:pos x="connsiteX23" y="connsiteY23"/>
-                </a:cxn>
-              </a:cxnLst>
-              <a:rect l="l" t="t" r="r" b="b"/>
-              <a:pathLst>
-                <a:path w="3815986" h="2675935">
-                  <a:moveTo>
-                    <a:pt x="3648768" y="0"/>
-                  </a:moveTo>
-                  <a:lnTo>
-                    <a:pt x="3815986" y="0"/>
-                  </a:lnTo>
-                  <a:lnTo>
-                    <a:pt x="3804695" y="200084"/>
-                  </a:lnTo>
-                  <a:cubicBezTo>
-                    <a:pt x="3795228" y="285751"/>
-                    <a:pt x="3781167" y="371032"/>
-                    <a:pt x="3762590" y="455543"/>
-                  </a:cubicBezTo>
-                  <a:cubicBezTo>
-                    <a:pt x="3725537" y="624467"/>
-                    <a:pt x="3668784" y="790112"/>
-                    <a:pt x="3592332" y="947274"/>
-                  </a:cubicBezTo>
-                  <a:cubicBezTo>
-                    <a:pt x="3438712" y="1261596"/>
-                    <a:pt x="3216091" y="1542847"/>
-                    <a:pt x="2953967" y="1782349"/>
-                  </a:cubicBezTo>
-                  <a:cubicBezTo>
-                    <a:pt x="2822599" y="1902099"/>
-                    <a:pt x="2680615" y="2011341"/>
-                    <a:pt x="2530669" y="2109494"/>
-                  </a:cubicBezTo>
-                  <a:cubicBezTo>
-                    <a:pt x="2380520" y="2207551"/>
-                    <a:pt x="2222510" y="2294906"/>
-                    <a:pt x="2057561" y="2369245"/>
-                  </a:cubicBezTo>
-                  <a:cubicBezTo>
-                    <a:pt x="1727252" y="2516859"/>
-                    <a:pt x="1371629" y="2614434"/>
-                    <a:pt x="1007330" y="2655701"/>
-                  </a:cubicBezTo>
-                  <a:cubicBezTo>
-                    <a:pt x="916281" y="2665873"/>
-                    <a:pt x="824568" y="2672188"/>
-                    <a:pt x="732765" y="2674696"/>
-                  </a:cubicBezTo>
-                  <a:cubicBezTo>
-                    <a:pt x="640963" y="2677203"/>
-                    <a:pt x="549072" y="2675901"/>
-                    <a:pt x="457666" y="2670839"/>
-                  </a:cubicBezTo>
-                  <a:cubicBezTo>
-                    <a:pt x="366106" y="2665584"/>
-                    <a:pt x="274572" y="2656521"/>
-                    <a:pt x="183574" y="2643312"/>
-                  </a:cubicBezTo>
-                  <a:lnTo>
-                    <a:pt x="0" y="2607798"/>
-                  </a:lnTo>
-                  <a:lnTo>
-                    <a:pt x="0" y="2356652"/>
-                  </a:lnTo>
-                  <a:lnTo>
-                    <a:pt x="222195" y="2396940"/>
-                  </a:lnTo>
-                  <a:cubicBezTo>
-                    <a:pt x="304990" y="2407980"/>
-                    <a:pt x="388511" y="2415283"/>
-                    <a:pt x="472364" y="2419092"/>
-                  </a:cubicBezTo>
-                  <a:cubicBezTo>
-                    <a:pt x="640376" y="2427095"/>
-                    <a:pt x="808184" y="2421791"/>
-                    <a:pt x="974972" y="2402122"/>
-                  </a:cubicBezTo>
-                  <a:cubicBezTo>
-                    <a:pt x="1141658" y="2382358"/>
-                    <a:pt x="1306812" y="2349286"/>
-                    <a:pt x="1468292" y="2304162"/>
-                  </a:cubicBezTo>
-                  <a:cubicBezTo>
-                    <a:pt x="1629874" y="2259231"/>
-                    <a:pt x="1787475" y="2201091"/>
-                    <a:pt x="1940176" y="2133695"/>
-                  </a:cubicBezTo>
-                  <a:cubicBezTo>
-                    <a:pt x="2246498" y="2000349"/>
-                    <a:pt x="2532507" y="1823520"/>
-                    <a:pt x="2783403" y="1609954"/>
-                  </a:cubicBezTo>
-                  <a:cubicBezTo>
-                    <a:pt x="2908442" y="1502833"/>
-                    <a:pt x="3024295" y="1385975"/>
-                    <a:pt x="3128104" y="1260439"/>
-                  </a:cubicBezTo>
-                  <a:cubicBezTo>
-                    <a:pt x="3232116" y="1135096"/>
-                    <a:pt x="3323881" y="1000689"/>
-                    <a:pt x="3400639" y="859052"/>
-                  </a:cubicBezTo>
-                  <a:cubicBezTo>
-                    <a:pt x="3477399" y="717510"/>
-                    <a:pt x="3541296" y="569316"/>
-                    <a:pt x="3585595" y="415336"/>
-                  </a:cubicBezTo>
-                  <a:cubicBezTo>
-                    <a:pt x="3607796" y="338540"/>
-                    <a:pt x="3624638" y="260224"/>
-                    <a:pt x="3635918" y="181137"/>
-                  </a:cubicBezTo>
-                  <a:close/>
-                </a:path>
-              </a:pathLst>
-            </a:custGeom>
-            <a:gradFill>
-              <a:gsLst>
-                <a:gs pos="2000">
-                  <a:schemeClr val="bg1">
-                    <a:alpha val="10000"/>
-                  </a:schemeClr>
-                </a:gs>
-                <a:gs pos="16000">
-                  <a:schemeClr val="accent6">
-                    <a:alpha val="10000"/>
-                  </a:schemeClr>
-                </a:gs>
-                <a:gs pos="100000">
-                  <a:schemeClr val="bg1">
-                    <a:alpha val="10000"/>
-                  </a:schemeClr>
-                </a:gs>
-                <a:gs pos="85000">
-                  <a:schemeClr val="accent1">
-                    <a:alpha val="10000"/>
-                  </a:schemeClr>
-                </a:gs>
-              </a:gsLst>
-              <a:lin ang="12000000" scaled="0"/>
-            </a:gradFill>
-            <a:ln>
-              <a:noFill/>
-            </a:ln>
-          </p:spPr>
-          <p:style>
-            <a:lnRef idx="2">
-              <a:schemeClr val="accent1">
-                <a:shade val="50000"/>
-              </a:schemeClr>
-            </a:lnRef>
-            <a:fillRef idx="1">
-              <a:schemeClr val="accent1"/>
-            </a:fillRef>
-            <a:effectRef idx="0">
-              <a:schemeClr val="accent1"/>
-            </a:effectRef>
-            <a:fontRef idx="minor">
-              <a:schemeClr val="lt1"/>
-            </a:fontRef>
-          </p:style>
-          <p:txBody>
-            <a:bodyPr rtlCol="0" anchor="ctr"/>
-            <a:lstStyle/>
-            <a:p>
-              <a:pPr algn="ctr"/>
-              <a:endParaRPr lang="en-US" noProof="0" dirty="0"/>
-            </a:p>
-          </p:txBody>
-        </p:sp>
-        <p:sp>
-          <p:nvSpPr>
-            <p:cNvPr id="1047" name="Freeform: Shape 1046">
-              <a:extLst>
-                <a:ext uri="{FF2B5EF4-FFF2-40B4-BE49-F238E27FC236}">
-                  <a16:creationId xmlns:a16="http://schemas.microsoft.com/office/drawing/2014/main" id="{B7A9A916-A926-43E6-800F-432ABC3F2444}"/>
-                </a:ext>
-                <a:ext uri="{C183D7F6-B498-43B3-948B-1728B52AA6E4}">
-                  <adec:decorative xmlns="" xmlns:adec="http://schemas.microsoft.com/office/drawing/2017/decorative" val="1"/>
-                </a:ext>
-              </a:extLst>
-            </p:cNvPr>
-            <p:cNvSpPr/>
-            <p:nvPr>
-              <p:extLst>
-                <p:ext uri="{386F3935-93C4-4BCD-93E2-E3B085C9AB24}">
-                  <p16:designElem xmlns:p16="http://schemas.microsoft.com/office/powerpoint/2015/main" val="1"/>
-                </p:ext>
-              </p:extLst>
-            </p:nvPr>
-          </p:nvSpPr>
-          <p:spPr>
-            <a:xfrm>
-              <a:off x="305" y="-1"/>
-              <a:ext cx="3832270" cy="2876136"/>
-            </a:xfrm>
-            <a:custGeom>
-              <a:avLst/>
-              <a:gdLst>
-                <a:gd name="connsiteX0" fmla="*/ 3800718 w 3832270"/>
-                <a:gd name="connsiteY0" fmla="*/ 0 h 2876136"/>
-                <a:gd name="connsiteX1" fmla="*/ 3832270 w 3832270"/>
-                <a:gd name="connsiteY1" fmla="*/ 0 h 2876136"/>
-                <a:gd name="connsiteX2" fmla="*/ 3824562 w 3832270"/>
-                <a:gd name="connsiteY2" fmla="*/ 143769 h 2876136"/>
-                <a:gd name="connsiteX3" fmla="*/ 3628155 w 3832270"/>
-                <a:gd name="connsiteY3" fmla="*/ 922055 h 2876136"/>
-                <a:gd name="connsiteX4" fmla="*/ 3514853 w 3832270"/>
-                <a:gd name="connsiteY4" fmla="*/ 1169078 h 2876136"/>
-                <a:gd name="connsiteX5" fmla="*/ 3379198 w 3832270"/>
-                <a:gd name="connsiteY5" fmla="*/ 1407037 h 2876136"/>
-                <a:gd name="connsiteX6" fmla="*/ 3043787 w 3832270"/>
-                <a:gd name="connsiteY6" fmla="*/ 1848342 h 2876136"/>
-                <a:gd name="connsiteX7" fmla="*/ 2845661 w 3832270"/>
-                <a:gd name="connsiteY7" fmla="*/ 2047444 h 2876136"/>
-                <a:gd name="connsiteX8" fmla="*/ 2793197 w 3832270"/>
-                <a:gd name="connsiteY8" fmla="*/ 2094689 h 2876136"/>
-                <a:gd name="connsiteX9" fmla="*/ 2739710 w 3832270"/>
-                <a:gd name="connsiteY9" fmla="*/ 2140969 h 2876136"/>
-                <a:gd name="connsiteX10" fmla="*/ 2629166 w 3832270"/>
-                <a:gd name="connsiteY10" fmla="*/ 2229867 h 2876136"/>
-                <a:gd name="connsiteX11" fmla="*/ 2145952 w 3832270"/>
-                <a:gd name="connsiteY11" fmla="*/ 2535994 h 2876136"/>
-                <a:gd name="connsiteX12" fmla="*/ 1034987 w 3832270"/>
-                <a:gd name="connsiteY12" fmla="*/ 2863910 h 2876136"/>
-                <a:gd name="connsiteX13" fmla="*/ 741909 w 3832270"/>
-                <a:gd name="connsiteY13" fmla="*/ 2875939 h 2876136"/>
-                <a:gd name="connsiteX14" fmla="*/ 450208 w 3832270"/>
-                <a:gd name="connsiteY14" fmla="*/ 2857451 h 2876136"/>
-                <a:gd name="connsiteX15" fmla="*/ 22215 w 3832270"/>
-                <a:gd name="connsiteY15" fmla="*/ 2775923 h 2876136"/>
-                <a:gd name="connsiteX16" fmla="*/ 0 w 3832270"/>
-                <a:gd name="connsiteY16" fmla="*/ 2769256 h 2876136"/>
-                <a:gd name="connsiteX17" fmla="*/ 0 w 3832270"/>
-                <a:gd name="connsiteY17" fmla="*/ 2590612 h 2876136"/>
-                <a:gd name="connsiteX18" fmla="*/ 199046 w 3832270"/>
-                <a:gd name="connsiteY18" fmla="*/ 2627410 h 2876136"/>
-                <a:gd name="connsiteX19" fmla="*/ 468174 w 3832270"/>
-                <a:gd name="connsiteY19" fmla="*/ 2649670 h 2876136"/>
-                <a:gd name="connsiteX20" fmla="*/ 1003650 w 3832270"/>
-                <a:gd name="connsiteY20" fmla="*/ 2622480 h 2876136"/>
-                <a:gd name="connsiteX21" fmla="*/ 1266489 w 3832270"/>
-                <a:gd name="connsiteY21" fmla="*/ 2573982 h 2876136"/>
-                <a:gd name="connsiteX22" fmla="*/ 1524223 w 3832270"/>
-                <a:gd name="connsiteY22" fmla="*/ 2504657 h 2876136"/>
-                <a:gd name="connsiteX23" fmla="*/ 1775731 w 3832270"/>
-                <a:gd name="connsiteY23" fmla="*/ 2416243 h 2876136"/>
-                <a:gd name="connsiteX24" fmla="*/ 2019789 w 3832270"/>
-                <a:gd name="connsiteY24" fmla="*/ 2309412 h 2876136"/>
-                <a:gd name="connsiteX25" fmla="*/ 2482486 w 3832270"/>
-                <a:gd name="connsiteY25" fmla="*/ 2046962 h 2876136"/>
-                <a:gd name="connsiteX26" fmla="*/ 2591908 w 3832270"/>
-                <a:gd name="connsiteY26" fmla="*/ 1971371 h 2876136"/>
-                <a:gd name="connsiteX27" fmla="*/ 2645702 w 3832270"/>
-                <a:gd name="connsiteY27" fmla="*/ 1932321 h 2876136"/>
-                <a:gd name="connsiteX28" fmla="*/ 2698779 w 3832270"/>
-                <a:gd name="connsiteY28" fmla="*/ 1892309 h 2876136"/>
-                <a:gd name="connsiteX29" fmla="*/ 2903537 w 3832270"/>
-                <a:gd name="connsiteY29" fmla="*/ 1722516 h 2876136"/>
-                <a:gd name="connsiteX30" fmla="*/ 3269061 w 3832270"/>
-                <a:gd name="connsiteY30" fmla="*/ 1337327 h 2876136"/>
-                <a:gd name="connsiteX31" fmla="*/ 3424928 w 3832270"/>
-                <a:gd name="connsiteY31" fmla="*/ 1122508 h 2876136"/>
-                <a:gd name="connsiteX32" fmla="*/ 3557622 w 3832270"/>
-                <a:gd name="connsiteY32" fmla="*/ 893226 h 2876136"/>
-                <a:gd name="connsiteX33" fmla="*/ 3587019 w 3832270"/>
-                <a:gd name="connsiteY33" fmla="*/ 833929 h 2876136"/>
-                <a:gd name="connsiteX34" fmla="*/ 3601310 w 3832270"/>
-                <a:gd name="connsiteY34" fmla="*/ 804040 h 2876136"/>
-                <a:gd name="connsiteX35" fmla="*/ 3614885 w 3832270"/>
-                <a:gd name="connsiteY35" fmla="*/ 773861 h 2876136"/>
-                <a:gd name="connsiteX36" fmla="*/ 3640812 w 3832270"/>
-                <a:gd name="connsiteY36" fmla="*/ 713022 h 2876136"/>
-                <a:gd name="connsiteX37" fmla="*/ 3665105 w 3832270"/>
-                <a:gd name="connsiteY37" fmla="*/ 651506 h 2876136"/>
-                <a:gd name="connsiteX38" fmla="*/ 3744110 w 3832270"/>
-                <a:gd name="connsiteY38" fmla="*/ 399567 h 2876136"/>
-                <a:gd name="connsiteX39" fmla="*/ 3792123 w 3832270"/>
-                <a:gd name="connsiteY39" fmla="*/ 140444 h 2876136"/>
-              </a:gdLst>
-              <a:ahLst/>
-              <a:cxnLst>
-                <a:cxn ang="0">
-                  <a:pos x="connsiteX0" y="connsiteY0"/>
-                </a:cxn>
-                <a:cxn ang="0">
-                  <a:pos x="connsiteX1" y="connsiteY1"/>
-                </a:cxn>
-                <a:cxn ang="0">
-                  <a:pos x="connsiteX2" y="connsiteY2"/>
-                </a:cxn>
-                <a:cxn ang="0">
-                  <a:pos x="connsiteX3" y="connsiteY3"/>
-                </a:cxn>
-                <a:cxn ang="0">
-                  <a:pos x="connsiteX4" y="connsiteY4"/>
-                </a:cxn>
-                <a:cxn ang="0">
-                  <a:pos x="connsiteX5" y="connsiteY5"/>
-                </a:cxn>
-                <a:cxn ang="0">
-                  <a:pos x="connsiteX6" y="connsiteY6"/>
-                </a:cxn>
-                <a:cxn ang="0">
-                  <a:pos x="connsiteX7" y="connsiteY7"/>
-                </a:cxn>
-                <a:cxn ang="0">
-                  <a:pos x="connsiteX8" y="connsiteY8"/>
-                </a:cxn>
-                <a:cxn ang="0">
-                  <a:pos x="connsiteX9" y="connsiteY9"/>
-                </a:cxn>
-                <a:cxn ang="0">
-                  <a:pos x="connsiteX10" y="connsiteY10"/>
-                </a:cxn>
-                <a:cxn ang="0">
-                  <a:pos x="connsiteX11" y="connsiteY11"/>
-                </a:cxn>
-                <a:cxn ang="0">
-                  <a:pos x="connsiteX12" y="connsiteY12"/>
-                </a:cxn>
-                <a:cxn ang="0">
-                  <a:pos x="connsiteX13" y="connsiteY13"/>
-                </a:cxn>
-                <a:cxn ang="0">
-                  <a:pos x="connsiteX14" y="connsiteY14"/>
-                </a:cxn>
-                <a:cxn ang="0">
-                  <a:pos x="connsiteX15" y="connsiteY15"/>
-                </a:cxn>
-                <a:cxn ang="0">
-                  <a:pos x="connsiteX16" y="connsiteY16"/>
-                </a:cxn>
-                <a:cxn ang="0">
-                  <a:pos x="connsiteX17" y="connsiteY17"/>
-                </a:cxn>
-                <a:cxn ang="0">
-                  <a:pos x="connsiteX18" y="connsiteY18"/>
-                </a:cxn>
-                <a:cxn ang="0">
-                  <a:pos x="connsiteX19" y="connsiteY19"/>
-                </a:cxn>
-                <a:cxn ang="0">
-                  <a:pos x="connsiteX20" y="connsiteY20"/>
-                </a:cxn>
-                <a:cxn ang="0">
-                  <a:pos x="connsiteX21" y="connsiteY21"/>
-                </a:cxn>
-                <a:cxn ang="0">
-                  <a:pos x="connsiteX22" y="connsiteY22"/>
-                </a:cxn>
-                <a:cxn ang="0">
-                  <a:pos x="connsiteX23" y="connsiteY23"/>
-                </a:cxn>
-                <a:cxn ang="0">
-                  <a:pos x="connsiteX24" y="connsiteY24"/>
-                </a:cxn>
-                <a:cxn ang="0">
-                  <a:pos x="connsiteX25" y="connsiteY25"/>
-                </a:cxn>
-                <a:cxn ang="0">
-                  <a:pos x="connsiteX26" y="connsiteY26"/>
-                </a:cxn>
-                <a:cxn ang="0">
-                  <a:pos x="connsiteX27" y="connsiteY27"/>
-                </a:cxn>
-                <a:cxn ang="0">
-                  <a:pos x="connsiteX28" y="connsiteY28"/>
-                </a:cxn>
-                <a:cxn ang="0">
-                  <a:pos x="connsiteX29" y="connsiteY29"/>
-                </a:cxn>
-                <a:cxn ang="0">
-                  <a:pos x="connsiteX30" y="connsiteY30"/>
-                </a:cxn>
-                <a:cxn ang="0">
-                  <a:pos x="connsiteX31" y="connsiteY31"/>
-                </a:cxn>
-                <a:cxn ang="0">
-                  <a:pos x="connsiteX32" y="connsiteY32"/>
-                </a:cxn>
-                <a:cxn ang="0">
-                  <a:pos x="connsiteX33" y="connsiteY33"/>
-                </a:cxn>
-                <a:cxn ang="0">
-                  <a:pos x="connsiteX34" y="connsiteY34"/>
-                </a:cxn>
-                <a:cxn ang="0">
-                  <a:pos x="connsiteX35" y="connsiteY35"/>
-                </a:cxn>
-                <a:cxn ang="0">
-                  <a:pos x="connsiteX36" y="connsiteY36"/>
-                </a:cxn>
-                <a:cxn ang="0">
-                  <a:pos x="connsiteX37" y="connsiteY37"/>
-                </a:cxn>
-                <a:cxn ang="0">
-                  <a:pos x="connsiteX38" y="connsiteY38"/>
-                </a:cxn>
-                <a:cxn ang="0">
-                  <a:pos x="connsiteX39" y="connsiteY39"/>
-                </a:cxn>
-              </a:cxnLst>
-              <a:rect l="l" t="t" r="r" b="b"/>
-              <a:pathLst>
-                <a:path w="3832270" h="2876136">
-                  <a:moveTo>
-                    <a:pt x="3800718" y="0"/>
-                  </a:moveTo>
-                  <a:lnTo>
-                    <a:pt x="3832270" y="0"/>
-                  </a:lnTo>
-                  <a:lnTo>
-                    <a:pt x="3824562" y="143769"/>
-                  </a:lnTo>
-                  <a:cubicBezTo>
-                    <a:pt x="3797131" y="409191"/>
-                    <a:pt x="3730585" y="671345"/>
-                    <a:pt x="3628155" y="922055"/>
-                  </a:cubicBezTo>
-                  <a:cubicBezTo>
-                    <a:pt x="3593858" y="1005553"/>
-                    <a:pt x="3556704" y="1088280"/>
-                    <a:pt x="3514853" y="1169078"/>
-                  </a:cubicBezTo>
-                  <a:cubicBezTo>
-                    <a:pt x="3473616" y="1250166"/>
-                    <a:pt x="3428194" y="1329517"/>
-                    <a:pt x="3379198" y="1407037"/>
-                  </a:cubicBezTo>
-                  <a:cubicBezTo>
-                    <a:pt x="3281106" y="1561980"/>
-                    <a:pt x="3169132" y="1710174"/>
-                    <a:pt x="3043787" y="1848342"/>
-                  </a:cubicBezTo>
-                  <a:cubicBezTo>
-                    <a:pt x="2980806" y="1917184"/>
-                    <a:pt x="2915071" y="1984001"/>
-                    <a:pt x="2845661" y="2047444"/>
-                  </a:cubicBezTo>
-                  <a:cubicBezTo>
-                    <a:pt x="2828411" y="2063450"/>
-                    <a:pt x="2811060" y="2079263"/>
-                    <a:pt x="2793197" y="2094689"/>
-                  </a:cubicBezTo>
-                  <a:cubicBezTo>
-                    <a:pt x="2775436" y="2110213"/>
-                    <a:pt x="2757982" y="2126025"/>
-                    <a:pt x="2739710" y="2140969"/>
-                  </a:cubicBezTo>
-                  <a:cubicBezTo>
-                    <a:pt x="2703576" y="2171341"/>
-                    <a:pt x="2666524" y="2200749"/>
-                    <a:pt x="2629166" y="2229867"/>
-                  </a:cubicBezTo>
-                  <a:cubicBezTo>
-                    <a:pt x="2479015" y="2345569"/>
-                    <a:pt x="2316821" y="2448061"/>
-                    <a:pt x="2145952" y="2535994"/>
-                  </a:cubicBezTo>
-                  <a:cubicBezTo>
-                    <a:pt x="1804312" y="2711957"/>
-                    <a:pt x="1424600" y="2826982"/>
-                    <a:pt x="1034987" y="2863910"/>
-                  </a:cubicBezTo>
-                  <a:cubicBezTo>
-                    <a:pt x="937762" y="2873167"/>
-                    <a:pt x="839720" y="2877096"/>
-                    <a:pt x="741909" y="2875939"/>
-                  </a:cubicBezTo>
-                  <a:cubicBezTo>
-                    <a:pt x="644097" y="2874782"/>
-                    <a:pt x="546515" y="2868539"/>
-                    <a:pt x="450208" y="2857451"/>
-                  </a:cubicBezTo>
-                  <a:cubicBezTo>
-                    <a:pt x="305520" y="2840674"/>
-                    <a:pt x="162095" y="2813810"/>
-                    <a:pt x="22215" y="2775923"/>
-                  </a:cubicBezTo>
-                  <a:lnTo>
-                    <a:pt x="0" y="2769256"/>
-                  </a:lnTo>
-                  <a:lnTo>
-                    <a:pt x="0" y="2590612"/>
-                  </a:lnTo>
-                  <a:lnTo>
-                    <a:pt x="199046" y="2627410"/>
-                  </a:lnTo>
-                  <a:cubicBezTo>
-                    <a:pt x="288321" y="2639209"/>
-                    <a:pt x="378197" y="2646537"/>
-                    <a:pt x="468174" y="2649670"/>
-                  </a:cubicBezTo>
-                  <a:cubicBezTo>
-                    <a:pt x="648333" y="2656805"/>
-                    <a:pt x="826655" y="2647163"/>
-                    <a:pt x="1003650" y="2622480"/>
-                  </a:cubicBezTo>
-                  <a:cubicBezTo>
-                    <a:pt x="1091943" y="2609658"/>
-                    <a:pt x="1179725" y="2593747"/>
-                    <a:pt x="1266489" y="2573982"/>
-                  </a:cubicBezTo>
-                  <a:cubicBezTo>
-                    <a:pt x="1353250" y="2553927"/>
-                    <a:pt x="1439298" y="2531076"/>
-                    <a:pt x="1524223" y="2504657"/>
-                  </a:cubicBezTo>
-                  <a:cubicBezTo>
-                    <a:pt x="1609149" y="2478336"/>
-                    <a:pt x="1693052" y="2448833"/>
-                    <a:pt x="1775731" y="2416243"/>
-                  </a:cubicBezTo>
-                  <a:cubicBezTo>
-                    <a:pt x="1858309" y="2383557"/>
-                    <a:pt x="1939764" y="2347882"/>
-                    <a:pt x="2019789" y="2309412"/>
-                  </a:cubicBezTo>
-                  <a:cubicBezTo>
-                    <a:pt x="2179839" y="2232567"/>
-                    <a:pt x="2334583" y="2144923"/>
-                    <a:pt x="2482486" y="2046962"/>
-                  </a:cubicBezTo>
-                  <a:cubicBezTo>
-                    <a:pt x="2519334" y="2022376"/>
-                    <a:pt x="2556081" y="1997403"/>
-                    <a:pt x="2591908" y="1971371"/>
-                  </a:cubicBezTo>
-                  <a:cubicBezTo>
-                    <a:pt x="2610077" y="1958644"/>
-                    <a:pt x="2627838" y="1945434"/>
-                    <a:pt x="2645702" y="1932321"/>
-                  </a:cubicBezTo>
-                  <a:cubicBezTo>
-                    <a:pt x="2663666" y="1919305"/>
-                    <a:pt x="2681325" y="1905903"/>
-                    <a:pt x="2698779" y="1892309"/>
-                  </a:cubicBezTo>
-                  <a:cubicBezTo>
-                    <a:pt x="2768903" y="1838025"/>
-                    <a:pt x="2837496" y="1781717"/>
-                    <a:pt x="2903537" y="1722516"/>
-                  </a:cubicBezTo>
-                  <a:cubicBezTo>
-                    <a:pt x="3035926" y="1604501"/>
-                    <a:pt x="3158720" y="1475784"/>
-                    <a:pt x="3269061" y="1337327"/>
-                  </a:cubicBezTo>
-                  <a:cubicBezTo>
-                    <a:pt x="3324182" y="1268099"/>
-                    <a:pt x="3376341" y="1196461"/>
-                    <a:pt x="3424928" y="1122508"/>
-                  </a:cubicBezTo>
-                  <a:cubicBezTo>
-                    <a:pt x="3472697" y="1048170"/>
-                    <a:pt x="3517814" y="972000"/>
-                    <a:pt x="3557622" y="893226"/>
-                  </a:cubicBezTo>
-                  <a:cubicBezTo>
-                    <a:pt x="3567931" y="873654"/>
-                    <a:pt x="3577526" y="853791"/>
-                    <a:pt x="3587019" y="833929"/>
-                  </a:cubicBezTo>
-                  <a:lnTo>
-                    <a:pt x="3601310" y="804040"/>
-                  </a:lnTo>
-                  <a:lnTo>
-                    <a:pt x="3614885" y="773861"/>
-                  </a:lnTo>
-                  <a:cubicBezTo>
-                    <a:pt x="3623766" y="753709"/>
-                    <a:pt x="3632748" y="733559"/>
-                    <a:pt x="3640812" y="713022"/>
-                  </a:cubicBezTo>
-                  <a:cubicBezTo>
-                    <a:pt x="3648876" y="692485"/>
-                    <a:pt x="3657756" y="672236"/>
-                    <a:pt x="3665105" y="651506"/>
-                  </a:cubicBezTo>
-                  <a:cubicBezTo>
-                    <a:pt x="3696544" y="569166"/>
-                    <a:pt x="3723185" y="485089"/>
-                    <a:pt x="3744110" y="399567"/>
-                  </a:cubicBezTo>
-                  <a:cubicBezTo>
-                    <a:pt x="3765341" y="314238"/>
-                    <a:pt x="3781392" y="227654"/>
-                    <a:pt x="3792123" y="140444"/>
-                  </a:cubicBezTo>
-                  <a:close/>
-                </a:path>
-              </a:pathLst>
-            </a:custGeom>
-            <a:gradFill>
-              <a:gsLst>
-                <a:gs pos="2000">
-                  <a:schemeClr val="bg1">
-                    <a:alpha val="10000"/>
-                  </a:schemeClr>
-                </a:gs>
-                <a:gs pos="16000">
-                  <a:schemeClr val="accent6">
-                    <a:alpha val="10000"/>
-                  </a:schemeClr>
-                </a:gs>
-                <a:gs pos="100000">
-                  <a:schemeClr val="bg1">
-                    <a:alpha val="10000"/>
-                  </a:schemeClr>
-                </a:gs>
-                <a:gs pos="85000">
-                  <a:schemeClr val="accent1">
-                    <a:alpha val="10000"/>
-                  </a:schemeClr>
-                </a:gs>
-              </a:gsLst>
-              <a:lin ang="12000000" scaled="0"/>
-            </a:gradFill>
-            <a:ln>
-              <a:noFill/>
-            </a:ln>
-          </p:spPr>
-          <p:style>
-            <a:lnRef idx="2">
-              <a:schemeClr val="accent1">
-                <a:shade val="50000"/>
-              </a:schemeClr>
-            </a:lnRef>
-            <a:fillRef idx="1">
-              <a:schemeClr val="accent1"/>
-            </a:fillRef>
-            <a:effectRef idx="0">
-              <a:schemeClr val="accent1"/>
-            </a:effectRef>
-            <a:fontRef idx="minor">
-              <a:schemeClr val="lt1"/>
-            </a:fontRef>
-          </p:style>
-          <p:txBody>
-            <a:bodyPr rtlCol="0" anchor="ctr"/>
-            <a:lstStyle/>
-            <a:p>
-              <a:pPr algn="ctr"/>
-              <a:endParaRPr lang="en-US" noProof="0" dirty="0"/>
-            </a:p>
-          </p:txBody>
-        </p:sp>
-      </p:grpSp>
+          <a:prstGeom prst="rect">
+            <a:avLst/>
+          </a:prstGeom>
+        </p:spPr>
+      </p:pic>
+      <p:pic>
+        <p:nvPicPr>
+          <p:cNvPr id="5" name="Google Shape;87;p1">
+            <a:extLst>
+              <a:ext uri="{FF2B5EF4-FFF2-40B4-BE49-F238E27FC236}">
+                <a16:creationId xmlns:a16="http://schemas.microsoft.com/office/drawing/2014/main" id="{B880C247-065C-9EFA-C679-58D9C3D884C3}"/>
+              </a:ext>
+            </a:extLst>
+          </p:cNvPr>
+          <p:cNvPicPr preferRelativeResize="0"/>
+          <p:nvPr/>
+        </p:nvPicPr>
+        <p:blipFill rotWithShape="1">
+          <a:blip r:embed="rId4">
+            <a:alphaModFix/>
+          </a:blip>
+          <a:srcRect/>
+          <a:stretch/>
+        </p:blipFill>
+        <p:spPr>
+          <a:xfrm>
+            <a:off x="5319078" y="4407478"/>
+            <a:ext cx="1666801" cy="817925"/>
+          </a:xfrm>
+          <a:prstGeom prst="rect">
+            <a:avLst/>
+          </a:prstGeom>
+          <a:noFill/>
+          <a:ln>
+            <a:noFill/>
+          </a:ln>
+        </p:spPr>
+      </p:pic>
+      <p:pic>
+        <p:nvPicPr>
+          <p:cNvPr id="6" name="Google Shape;88;p1">
+            <a:extLst>
+              <a:ext uri="{FF2B5EF4-FFF2-40B4-BE49-F238E27FC236}">
+                <a16:creationId xmlns:a16="http://schemas.microsoft.com/office/drawing/2014/main" id="{11952D4A-FEE5-D309-0C1A-C292DE2F3602}"/>
+              </a:ext>
+            </a:extLst>
+          </p:cNvPr>
+          <p:cNvPicPr preferRelativeResize="0"/>
+          <p:nvPr/>
+        </p:nvPicPr>
+        <p:blipFill>
+          <a:blip r:embed="rId5">
+            <a:alphaModFix/>
+          </a:blip>
+          <a:stretch>
+            <a:fillRect/>
+          </a:stretch>
+        </p:blipFill>
+        <p:spPr>
+          <a:xfrm>
+            <a:off x="2052363" y="5308922"/>
+            <a:ext cx="1766350" cy="704550"/>
+          </a:xfrm>
+          <a:prstGeom prst="rect">
+            <a:avLst/>
+          </a:prstGeom>
+          <a:noFill/>
+          <a:ln>
+            <a:noFill/>
+          </a:ln>
+        </p:spPr>
+      </p:pic>
+      <p:pic>
+        <p:nvPicPr>
+          <p:cNvPr id="7" name="Google Shape;89;p1">
+            <a:extLst>
+              <a:ext uri="{FF2B5EF4-FFF2-40B4-BE49-F238E27FC236}">
+                <a16:creationId xmlns:a16="http://schemas.microsoft.com/office/drawing/2014/main" id="{A82956C5-2865-D142-E4BE-34772098B6AA}"/>
+              </a:ext>
+            </a:extLst>
+          </p:cNvPr>
+          <p:cNvPicPr preferRelativeResize="0"/>
+          <p:nvPr/>
+        </p:nvPicPr>
+        <p:blipFill>
+          <a:blip r:embed="rId6">
+            <a:alphaModFix/>
+          </a:blip>
+          <a:stretch>
+            <a:fillRect/>
+          </a:stretch>
+        </p:blipFill>
+        <p:spPr>
+          <a:xfrm>
+            <a:off x="6776836" y="5225403"/>
+            <a:ext cx="1481500" cy="969574"/>
+          </a:xfrm>
+          <a:prstGeom prst="rect">
+            <a:avLst/>
+          </a:prstGeom>
+          <a:noFill/>
+          <a:ln>
+            <a:noFill/>
+          </a:ln>
+        </p:spPr>
+      </p:pic>
+      <p:pic>
+        <p:nvPicPr>
+          <p:cNvPr id="15" name="Google Shape;88;p1">
+            <a:extLst>
+              <a:ext uri="{FF2B5EF4-FFF2-40B4-BE49-F238E27FC236}">
+                <a16:creationId xmlns:a16="http://schemas.microsoft.com/office/drawing/2014/main" id="{61DA5C0E-F699-2221-6C83-4D73F5108F5B}"/>
+              </a:ext>
+            </a:extLst>
+          </p:cNvPr>
+          <p:cNvPicPr preferRelativeResize="0"/>
+          <p:nvPr/>
+        </p:nvPicPr>
+        <p:blipFill>
+          <a:blip r:embed="rId7" cstate="hqprint">
+            <a:extLst>
+              <a:ext uri="{28A0092B-C50C-407E-A947-70E740481C1C}">
+                <a14:useLocalDpi xmlns:a14="http://schemas.microsoft.com/office/drawing/2010/main" val="0"/>
+              </a:ext>
+            </a:extLst>
+          </a:blip>
+          <a:srcRect/>
+          <a:stretch/>
+        </p:blipFill>
+        <p:spPr>
+          <a:xfrm>
+            <a:off x="4435903" y="5424948"/>
+            <a:ext cx="1766350" cy="472498"/>
+          </a:xfrm>
+          <a:prstGeom prst="rect">
+            <a:avLst/>
+          </a:prstGeom>
+          <a:noFill/>
+          <a:ln>
+            <a:noFill/>
+          </a:ln>
+        </p:spPr>
+      </p:pic>
     </p:spTree>
     <p:extLst>
       <p:ext uri="{BB962C8B-B14F-4D97-AF65-F5344CB8AC3E}">
-        <p14:creationId xmlns:p14="http://schemas.microsoft.com/office/powerpoint/2010/main" val="398173604"/>
+        <p14:creationId xmlns:p14="http://schemas.microsoft.com/office/powerpoint/2010/main" val="221555270"/>
       </p:ext>
     </p:extLst>
   </p:cSld>

</xml_diff>

<commit_message>
Modifica nombre de Current Steering a W-2W
</commit_message>
<xml_diff>
--- a/Diapositivas/BlockDiagram_CurrentSteeringDAC.pptx
+++ b/Diapositivas/BlockDiagram_CurrentSteeringDAC.pptx
@@ -3426,7 +3426,7 @@
                 </a:solidFill>
                 <a:latin typeface="PT Sans Narrow" panose="020B0506020203020204" pitchFamily="34" charset="0"/>
               </a:rPr>
-              <a:t>Current Steering DAC</a:t>
+              <a:t>2-2W Current Steering DAC</a:t>
             </a:r>
             <a:r>
               <a:rPr lang="en-US" sz="4000" b="0" i="0" u="none" strike="noStrike" noProof="0" dirty="0">
@@ -3776,8 +3776,8 @@
         </p:nvSpPr>
         <p:spPr>
           <a:xfrm>
-            <a:off x="2881737" y="156975"/>
-            <a:ext cx="6664004" cy="369332"/>
+            <a:off x="2639278" y="156975"/>
+            <a:ext cx="7353295" cy="369332"/>
           </a:xfrm>
           <a:prstGeom prst="rect">
             <a:avLst/>
@@ -3792,7 +3792,15 @@
           <a:p>
             <a:r>
               <a:rPr lang="en-US" b="1" dirty="0" smtClean="0"/>
-              <a:t>7-bit Current Steering DAC schematic and symbol</a:t>
+              <a:t>7-bit </a:t>
+            </a:r>
+            <a:r>
+              <a:rPr lang="en-US" b="1" dirty="0" smtClean="0"/>
+              <a:t>W-2W Current </a:t>
+            </a:r>
+            <a:r>
+              <a:rPr lang="en-US" b="1" dirty="0" smtClean="0"/>
+              <a:t>Steering DAC schematic and symbol</a:t>
             </a:r>
             <a:endParaRPr lang="en-US" b="1" dirty="0"/>
           </a:p>

</xml_diff>

<commit_message>
Agrega logos de Universidades
</commit_message>
<xml_diff>
--- a/Diapositivas/BlockDiagram_CurrentSteeringDAC.pptx
+++ b/Diapositivas/BlockDiagram_CurrentSteeringDAC.pptx
@@ -3580,7 +3580,7 @@
         </p:blipFill>
         <p:spPr>
           <a:xfrm>
-            <a:off x="8832919" y="5511443"/>
+            <a:off x="8467376" y="5482018"/>
             <a:ext cx="1649058" cy="299508"/>
           </a:xfrm>
           <a:prstGeom prst="rect">
@@ -3643,7 +3643,7 @@
         </p:blipFill>
         <p:spPr>
           <a:xfrm>
-            <a:off x="2052363" y="5308922"/>
+            <a:off x="2089366" y="5325175"/>
             <a:ext cx="1766350" cy="704550"/>
           </a:xfrm>
           <a:prstGeom prst="rect">
@@ -3677,7 +3677,7 @@
         </p:blipFill>
         <p:spPr>
           <a:xfrm>
-            <a:off x="6776836" y="5225403"/>
+            <a:off x="6152477" y="5225403"/>
             <a:ext cx="1481500" cy="969574"/>
           </a:xfrm>
           <a:prstGeom prst="rect">
@@ -3714,7 +3714,7 @@
         </p:blipFill>
         <p:spPr>
           <a:xfrm>
-            <a:off x="4435903" y="5424948"/>
+            <a:off x="4189415" y="5395523"/>
             <a:ext cx="1766350" cy="472498"/>
           </a:xfrm>
           <a:prstGeom prst="rect">
@@ -3724,6 +3724,54 @@
           <a:ln>
             <a:noFill/>
           </a:ln>
+        </p:spPr>
+      </p:pic>
+      <p:pic>
+        <p:nvPicPr>
+          <p:cNvPr id="3" name="Imagen 2"/>
+          <p:cNvPicPr>
+            <a:picLocks noChangeAspect="1"/>
+          </p:cNvPicPr>
+          <p:nvPr/>
+        </p:nvPicPr>
+        <p:blipFill>
+          <a:blip r:embed="rId8"/>
+          <a:stretch>
+            <a:fillRect/>
+          </a:stretch>
+        </p:blipFill>
+        <p:spPr>
+          <a:xfrm>
+            <a:off x="3319641" y="6058399"/>
+            <a:ext cx="3752407" cy="609766"/>
+          </a:xfrm>
+          <a:prstGeom prst="rect">
+            <a:avLst/>
+          </a:prstGeom>
+        </p:spPr>
+      </p:pic>
+      <p:pic>
+        <p:nvPicPr>
+          <p:cNvPr id="8" name="Imagen 7"/>
+          <p:cNvPicPr>
+            <a:picLocks noChangeAspect="1"/>
+          </p:cNvPicPr>
+          <p:nvPr/>
+        </p:nvPicPr>
+        <p:blipFill>
+          <a:blip r:embed="rId9"/>
+          <a:stretch>
+            <a:fillRect/>
+          </a:stretch>
+        </p:blipFill>
+        <p:spPr>
+          <a:xfrm>
+            <a:off x="7633977" y="5943045"/>
+            <a:ext cx="1386364" cy="740410"/>
+          </a:xfrm>
+          <a:prstGeom prst="rect">
+            <a:avLst/>
+          </a:prstGeom>
         </p:spPr>
       </p:pic>
     </p:spTree>
@@ -3792,15 +3840,7 @@
           <a:p>
             <a:r>
               <a:rPr lang="en-US" b="1" dirty="0" smtClean="0"/>
-              <a:t>7-bit </a:t>
-            </a:r>
-            <a:r>
-              <a:rPr lang="en-US" b="1" dirty="0" smtClean="0"/>
-              <a:t>W-2W Current </a:t>
-            </a:r>
-            <a:r>
-              <a:rPr lang="en-US" b="1" dirty="0" smtClean="0"/>
-              <a:t>Steering DAC schematic and symbol</a:t>
+              <a:t>7-bit W-2W Current Steering DAC schematic and symbol</a:t>
             </a:r>
             <a:endParaRPr lang="en-US" b="1" dirty="0"/>
           </a:p>

</xml_diff>